<commit_message>
Updated presentation w/ new image for state graph
</commit_message>
<xml_diff>
--- a/presentation/DS7346_Cloud_Computing_Presentation.pptx
+++ b/presentation/DS7346_Cloud_Computing_Presentation.pptx
@@ -144,6 +144,7 @@
 <p1510:revInfo xmlns:a="http://schemas.openxmlformats.org/drawingml/2006/main" xmlns:r="http://schemas.openxmlformats.org/officeDocument/2006/relationships" xmlns:p1510="http://schemas.microsoft.com/office/powerpoint/2015/10/main">
   <p1510:revLst>
     <p1510:client id="{65C67A5B-D439-DD4E-A637-827378D75345}" v="59" dt="2019-10-10T15:48:12.011"/>
+    <p1510:client id="{983D3192-F7B4-7C41-4CAA-55B54D0A3C83}" v="13" dt="2020-11-22T22:17:48.944"/>
   </p1510:revLst>
 </p1510:revInfo>
 </file>
@@ -230,7 +231,7 @@
           <a:p>
             <a:fld id="{05A716D1-0E3B-43FE-813B-2DAFF8230A94}" type="datetimeFigureOut">
               <a:rPr lang="en-US" smtClean="0"/>
-              <a:t>11/22/20</a:t>
+              <a:t>11/22/2020</a:t>
             </a:fld>
             <a:endParaRPr lang="en-US"/>
           </a:p>
@@ -9784,61 +9785,17 @@
                 <a:ea typeface="+mn-lt"/>
                 <a:cs typeface="+mn-lt"/>
               </a:rPr>
-              <a:t>Now looking at the wildfires by state, there’s definitely a skew in the data on the state.  The first 10 states make up a large majority of total number of wildfires as seen in Fig 3.</a:t>
+              <a:t>Now looking at the wildfires by state, there’s a skew in the data on the state.  The first 10 states make up a large majority of total number of wildfires as seen in Fig 3.</a:t>
             </a:r>
           </a:p>
         </p:txBody>
       </p:sp>
-      <p:sp>
-        <p:nvSpPr>
-          <p:cNvPr id="5" name="TextBox 4">
+      <p:pic>
+        <p:nvPicPr>
+          <p:cNvPr id="3" name="Picture 5" descr="Chart, histogram&#10;&#10;Description automatically generated">
             <a:extLst>
               <a:ext uri="{FF2B5EF4-FFF2-40B4-BE49-F238E27FC236}">
-                <a16:creationId xmlns:a16="http://schemas.microsoft.com/office/drawing/2014/main" id="{D00F2BCE-66B4-4C46-BAFC-8FFD1034CE40}"/>
-              </a:ext>
-            </a:extLst>
-          </p:cNvPr>
-          <p:cNvSpPr txBox="1"/>
-          <p:nvPr/>
-        </p:nvSpPr>
-        <p:spPr>
-          <a:xfrm>
-            <a:off x="542925" y="5972175"/>
-            <a:ext cx="3619500" cy="230832"/>
-          </a:xfrm>
-          <a:prstGeom prst="rect">
-            <a:avLst/>
-          </a:prstGeom>
-          <a:noFill/>
-        </p:spPr>
-        <p:txBody>
-          <a:bodyPr rot="0" spcFirstLastPara="0" vertOverflow="overflow" horzOverflow="overflow" vert="horz" wrap="square" lIns="91440" tIns="45720" rIns="91440" bIns="45720" numCol="1" spcCol="0" rtlCol="0" fromWordArt="0" anchor="t" anchorCtr="0" forceAA="0" compatLnSpc="1">
-            <a:prstTxWarp prst="textNoShape">
-              <a:avLst/>
-            </a:prstTxWarp>
-            <a:spAutoFit/>
-          </a:bodyPr>
-          <a:lstStyle/>
-          <a:p>
-            <a:r>
-              <a:rPr lang="en-US" sz="900" dirty="0">
-                <a:ea typeface="+mn-lt"/>
-                <a:cs typeface="+mn-lt"/>
-              </a:rPr>
-              <a:t>Fig 3 - US Wildfires by State</a:t>
-            </a:r>
-            <a:endParaRPr lang="en-US" sz="900">
-              <a:cs typeface="Arial"/>
-            </a:endParaRPr>
-          </a:p>
-        </p:txBody>
-      </p:sp>
-      <p:pic>
-        <p:nvPicPr>
-          <p:cNvPr id="4" name="Picture 5" descr="Chart, bar chart&#10;&#10;Description automatically generated">
-            <a:extLst>
-              <a:ext uri="{FF2B5EF4-FFF2-40B4-BE49-F238E27FC236}">
-                <a16:creationId xmlns:a16="http://schemas.microsoft.com/office/drawing/2014/main" id="{81DCC094-9D77-4CBD-846D-BBEACEA63082}"/>
+                <a16:creationId xmlns:a16="http://schemas.microsoft.com/office/drawing/2014/main" id="{8F11E569-AC29-418C-B581-66BA3A1D0B00}"/>
               </a:ext>
             </a:extLst>
           </p:cNvPr>
@@ -9855,14 +9812,58 @@
         </p:blipFill>
         <p:spPr>
           <a:xfrm>
-            <a:off x="547687" y="2009775"/>
-            <a:ext cx="7953375" cy="3981450"/>
+            <a:off x="438150" y="2074214"/>
+            <a:ext cx="8058150" cy="3976398"/>
           </a:xfrm>
           <a:prstGeom prst="rect">
             <a:avLst/>
           </a:prstGeom>
         </p:spPr>
       </p:pic>
+      <p:sp>
+        <p:nvSpPr>
+          <p:cNvPr id="5" name="TextBox 4">
+            <a:extLst>
+              <a:ext uri="{FF2B5EF4-FFF2-40B4-BE49-F238E27FC236}">
+                <a16:creationId xmlns:a16="http://schemas.microsoft.com/office/drawing/2014/main" id="{D00F2BCE-66B4-4C46-BAFC-8FFD1034CE40}"/>
+              </a:ext>
+            </a:extLst>
+          </p:cNvPr>
+          <p:cNvSpPr txBox="1"/>
+          <p:nvPr/>
+        </p:nvSpPr>
+        <p:spPr>
+          <a:xfrm>
+            <a:off x="542925" y="5972175"/>
+            <a:ext cx="3619500" cy="230832"/>
+          </a:xfrm>
+          <a:prstGeom prst="rect">
+            <a:avLst/>
+          </a:prstGeom>
+          <a:noFill/>
+        </p:spPr>
+        <p:txBody>
+          <a:bodyPr rot="0" spcFirstLastPara="0" vertOverflow="overflow" horzOverflow="overflow" vert="horz" wrap="square" lIns="91440" tIns="45720" rIns="91440" bIns="45720" numCol="1" spcCol="0" rtlCol="0" fromWordArt="0" anchor="t" anchorCtr="0" forceAA="0" compatLnSpc="1">
+            <a:prstTxWarp prst="textNoShape">
+              <a:avLst/>
+            </a:prstTxWarp>
+            <a:spAutoFit/>
+          </a:bodyPr>
+          <a:lstStyle/>
+          <a:p>
+            <a:r>
+              <a:rPr lang="en-US" sz="900" dirty="0">
+                <a:ea typeface="+mn-lt"/>
+                <a:cs typeface="+mn-lt"/>
+              </a:rPr>
+              <a:t>Fig 3 - US Wildfires by State</a:t>
+            </a:r>
+            <a:endParaRPr lang="en-US" sz="900">
+              <a:cs typeface="Arial"/>
+            </a:endParaRPr>
+          </a:p>
+        </p:txBody>
+      </p:sp>
     </p:spTree>
     <p:extLst>
       <p:ext uri="{BB962C8B-B14F-4D97-AF65-F5344CB8AC3E}">
@@ -10146,7 +10147,7 @@
         </p:blipFill>
         <p:spPr>
           <a:xfrm>
-            <a:off x="938212" y="3219450"/>
+            <a:off x="938212" y="3476625"/>
             <a:ext cx="3381375" cy="2057400"/>
           </a:xfrm>
           <a:prstGeom prst="rect">
@@ -10176,7 +10177,7 @@
         </p:blipFill>
         <p:spPr>
           <a:xfrm>
-            <a:off x="4938712" y="3205162"/>
+            <a:off x="4938712" y="3471862"/>
             <a:ext cx="3350890" cy="2105025"/>
           </a:xfrm>
           <a:prstGeom prst="rect">

</xml_diff>

<commit_message>
Removed unused slides and added placeholder for sreeni
</commit_message>
<xml_diff>
--- a/presentation/DS7346_Cloud_Computing_Presentation.pptx
+++ b/presentation/DS7346_Cloud_Computing_Presentation.pptx
@@ -5,7 +5,7 @@
     <p:sldMasterId id="2147483672" r:id="rId1"/>
   </p:sldMasterIdLst>
   <p:notesMasterIdLst>
-    <p:notesMasterId r:id="rId28"/>
+    <p:notesMasterId r:id="rId18"/>
   </p:notesMasterIdLst>
   <p:sldIdLst>
     <p:sldId id="580" r:id="rId2"/>
@@ -22,18 +22,8 @@
     <p:sldId id="634" r:id="rId13"/>
     <p:sldId id="631" r:id="rId14"/>
     <p:sldId id="630" r:id="rId15"/>
-    <p:sldId id="627" r:id="rId16"/>
-    <p:sldId id="622" r:id="rId17"/>
-    <p:sldId id="621" r:id="rId18"/>
-    <p:sldId id="623" r:id="rId19"/>
-    <p:sldId id="624" r:id="rId20"/>
-    <p:sldId id="625" r:id="rId21"/>
-    <p:sldId id="626" r:id="rId22"/>
-    <p:sldId id="632" r:id="rId23"/>
-    <p:sldId id="633" r:id="rId24"/>
-    <p:sldId id="635" r:id="rId25"/>
-    <p:sldId id="636" r:id="rId26"/>
-    <p:sldId id="526" r:id="rId27"/>
+    <p:sldId id="645" r:id="rId16"/>
+    <p:sldId id="526" r:id="rId17"/>
   </p:sldIdLst>
   <p:sldSz cx="9144000" cy="6858000" type="screen4x3"/>
   <p:notesSz cx="6858000" cy="9144000"/>
@@ -144,7 +134,7 @@
 <p1510:revInfo xmlns:a="http://schemas.openxmlformats.org/drawingml/2006/main" xmlns:r="http://schemas.openxmlformats.org/officeDocument/2006/relationships" xmlns:p1510="http://schemas.microsoft.com/office/powerpoint/2015/10/main">
   <p1510:revLst>
     <p1510:client id="{65C67A5B-D439-DD4E-A637-827378D75345}" v="59" dt="2019-10-10T15:48:12.011"/>
-    <p1510:client id="{983D3192-F7B4-7C41-4CAA-55B54D0A3C83}" v="13" dt="2020-11-22T22:17:48.944"/>
+    <p1510:client id="{983D3192-F7B4-7C41-4CAA-55B54D0A3C83}" v="29" dt="2020-11-22T22:30:09.115"/>
   </p1510:revLst>
 </p1510:revInfo>
 </file>
@@ -628,99 +618,6 @@
 </p:notes>
 </file>
 
-<file path=ppt/notesSlides/notesSlide10.xml><?xml version="1.0" encoding="utf-8"?>
-<p:notes xmlns:a="http://schemas.openxmlformats.org/drawingml/2006/main" xmlns:r="http://schemas.openxmlformats.org/officeDocument/2006/relationships" xmlns:p="http://schemas.openxmlformats.org/presentationml/2006/main">
-  <p:cSld>
-    <p:spTree>
-      <p:nvGrpSpPr>
-        <p:cNvPr id="1" name=""/>
-        <p:cNvGrpSpPr/>
-        <p:nvPr/>
-      </p:nvGrpSpPr>
-      <p:grpSpPr>
-        <a:xfrm>
-          <a:off x="0" y="0"/>
-          <a:ext cx="0" cy="0"/>
-          <a:chOff x="0" y="0"/>
-          <a:chExt cx="0" cy="0"/>
-        </a:xfrm>
-      </p:grpSpPr>
-      <p:sp>
-        <p:nvSpPr>
-          <p:cNvPr id="2" name="Slide Image Placeholder 1"/>
-          <p:cNvSpPr>
-            <a:spLocks noGrp="1" noRot="1" noChangeAspect="1"/>
-          </p:cNvSpPr>
-          <p:nvPr>
-            <p:ph type="sldImg"/>
-          </p:nvPr>
-        </p:nvSpPr>
-        <p:spPr/>
-      </p:sp>
-      <p:sp>
-        <p:nvSpPr>
-          <p:cNvPr id="3" name="Notes Placeholder 2"/>
-          <p:cNvSpPr>
-            <a:spLocks noGrp="1"/>
-          </p:cNvSpPr>
-          <p:nvPr>
-            <p:ph type="body" idx="1"/>
-          </p:nvPr>
-        </p:nvSpPr>
-        <p:spPr/>
-        <p:txBody>
-          <a:bodyPr/>
-          <a:lstStyle/>
-          <a:p>
-            <a:r>
-              <a:rPr lang="en-US" dirty="0"/>
-              <a:t>Florida and Main in particular</a:t>
-            </a:r>
-          </a:p>
-          <a:p>
-            <a:endParaRPr lang="en-US" dirty="0"/>
-          </a:p>
-          <a:p>
-            <a:endParaRPr lang="en-US" dirty="0"/>
-          </a:p>
-        </p:txBody>
-      </p:sp>
-      <p:sp>
-        <p:nvSpPr>
-          <p:cNvPr id="4" name="Slide Number Placeholder 3"/>
-          <p:cNvSpPr>
-            <a:spLocks noGrp="1"/>
-          </p:cNvSpPr>
-          <p:nvPr>
-            <p:ph type="sldNum" sz="quarter" idx="5"/>
-          </p:nvPr>
-        </p:nvSpPr>
-        <p:spPr/>
-        <p:txBody>
-          <a:bodyPr/>
-          <a:lstStyle/>
-          <a:p>
-            <a:fld id="{1B0D91D7-F22D-4CDC-8F75-E7F369B9B3B7}" type="slidenum">
-              <a:rPr lang="en-US" smtClean="0"/>
-              <a:t>24</a:t>
-            </a:fld>
-            <a:endParaRPr lang="en-US"/>
-          </a:p>
-        </p:txBody>
-      </p:sp>
-    </p:spTree>
-    <p:extLst>
-      <p:ext uri="{BB962C8B-B14F-4D97-AF65-F5344CB8AC3E}">
-        <p14:creationId xmlns:p14="http://schemas.microsoft.com/office/powerpoint/2010/main" val="1021268098"/>
-      </p:ext>
-    </p:extLst>
-  </p:cSld>
-  <p:clrMapOvr>
-    <a:masterClrMapping/>
-  </p:clrMapOvr>
-</p:notes>
-</file>
-
 <file path=ppt/notesSlides/notesSlide2.xml><?xml version="1.0" encoding="utf-8"?>
 <p:notes xmlns:a="http://schemas.openxmlformats.org/drawingml/2006/main" xmlns:r="http://schemas.openxmlformats.org/officeDocument/2006/relationships" xmlns:p="http://schemas.openxmlformats.org/presentationml/2006/main">
   <p:cSld>
@@ -1278,437 +1175,6 @@
     <p:extLst>
       <p:ext uri="{BB962C8B-B14F-4D97-AF65-F5344CB8AC3E}">
         <p14:creationId xmlns:p14="http://schemas.microsoft.com/office/powerpoint/2010/main" val="3353241369"/>
-      </p:ext>
-    </p:extLst>
-  </p:cSld>
-  <p:clrMapOvr>
-    <a:masterClrMapping/>
-  </p:clrMapOvr>
-</p:notes>
-</file>
-
-<file path=ppt/notesSlides/notesSlide6.xml><?xml version="1.0" encoding="utf-8"?>
-<p:notes xmlns:a="http://schemas.openxmlformats.org/drawingml/2006/main" xmlns:r="http://schemas.openxmlformats.org/officeDocument/2006/relationships" xmlns:p="http://schemas.openxmlformats.org/presentationml/2006/main">
-  <p:cSld>
-    <p:spTree>
-      <p:nvGrpSpPr>
-        <p:cNvPr id="1" name=""/>
-        <p:cNvGrpSpPr/>
-        <p:nvPr/>
-      </p:nvGrpSpPr>
-      <p:grpSpPr>
-        <a:xfrm>
-          <a:off x="0" y="0"/>
-          <a:ext cx="0" cy="0"/>
-          <a:chOff x="0" y="0"/>
-          <a:chExt cx="0" cy="0"/>
-        </a:xfrm>
-      </p:grpSpPr>
-      <p:sp>
-        <p:nvSpPr>
-          <p:cNvPr id="2" name="Slide Image Placeholder 1"/>
-          <p:cNvSpPr>
-            <a:spLocks noGrp="1" noRot="1" noChangeAspect="1"/>
-          </p:cNvSpPr>
-          <p:nvPr>
-            <p:ph type="sldImg"/>
-          </p:nvPr>
-        </p:nvSpPr>
-        <p:spPr/>
-      </p:sp>
-      <p:sp>
-        <p:nvSpPr>
-          <p:cNvPr id="3" name="Notes Placeholder 2"/>
-          <p:cNvSpPr>
-            <a:spLocks noGrp="1"/>
-          </p:cNvSpPr>
-          <p:nvPr>
-            <p:ph type="body" idx="1"/>
-          </p:nvPr>
-        </p:nvSpPr>
-        <p:spPr/>
-        <p:txBody>
-          <a:bodyPr/>
-          <a:lstStyle/>
-          <a:p>
-            <a:pPr marL="0" marR="0" lvl="0" indent="0" algn="l" defTabSz="914400" rtl="0" eaLnBrk="1" fontAlgn="auto" latinLnBrk="0" hangingPunct="1">
-              <a:lnSpc>
-                <a:spcPct val="100000"/>
-              </a:lnSpc>
-              <a:spcBef>
-                <a:spcPts val="0"/>
-              </a:spcBef>
-              <a:spcAft>
-                <a:spcPts val="0"/>
-              </a:spcAft>
-              <a:buClrTx/>
-              <a:buSzTx/>
-              <a:buFontTx/>
-              <a:buNone/>
-              <a:tabLst/>
-              <a:defRPr/>
-            </a:pPr>
-            <a:r>
-              <a:rPr lang="en-US" i="1" dirty="0"/>
-              <a:t>2,410 US craft beers</a:t>
-            </a:r>
-          </a:p>
-          <a:p>
-            <a:pPr marL="0" marR="0" lvl="0" indent="0" algn="l" defTabSz="914400" rtl="0" eaLnBrk="1" fontAlgn="auto" latinLnBrk="0" hangingPunct="1">
-              <a:lnSpc>
-                <a:spcPct val="100000"/>
-              </a:lnSpc>
-              <a:spcBef>
-                <a:spcPts val="0"/>
-              </a:spcBef>
-              <a:spcAft>
-                <a:spcPts val="0"/>
-              </a:spcAft>
-              <a:buClrTx/>
-              <a:buSzTx/>
-              <a:buFontTx/>
-              <a:buNone/>
-              <a:tabLst/>
-              <a:defRPr/>
-            </a:pPr>
-            <a:r>
-              <a:rPr lang="en-US" i="1" dirty="0"/>
-              <a:t>558 US craft breweries</a:t>
-            </a:r>
-          </a:p>
-          <a:p>
-            <a:endParaRPr lang="en-US" dirty="0"/>
-          </a:p>
-        </p:txBody>
-      </p:sp>
-      <p:sp>
-        <p:nvSpPr>
-          <p:cNvPr id="4" name="Slide Number Placeholder 3"/>
-          <p:cNvSpPr>
-            <a:spLocks noGrp="1"/>
-          </p:cNvSpPr>
-          <p:nvPr>
-            <p:ph type="sldNum" sz="quarter" idx="5"/>
-          </p:nvPr>
-        </p:nvSpPr>
-        <p:spPr/>
-        <p:txBody>
-          <a:bodyPr/>
-          <a:lstStyle/>
-          <a:p>
-            <a:fld id="{1B0D91D7-F22D-4CDC-8F75-E7F369B9B3B7}" type="slidenum">
-              <a:rPr lang="en-US" smtClean="0"/>
-              <a:t>16</a:t>
-            </a:fld>
-            <a:endParaRPr lang="en-US"/>
-          </a:p>
-        </p:txBody>
-      </p:sp>
-    </p:spTree>
-    <p:extLst>
-      <p:ext uri="{BB962C8B-B14F-4D97-AF65-F5344CB8AC3E}">
-        <p14:creationId xmlns:p14="http://schemas.microsoft.com/office/powerpoint/2010/main" val="1036460107"/>
-      </p:ext>
-    </p:extLst>
-  </p:cSld>
-  <p:clrMapOvr>
-    <a:masterClrMapping/>
-  </p:clrMapOvr>
-</p:notes>
-</file>
-
-<file path=ppt/notesSlides/notesSlide7.xml><?xml version="1.0" encoding="utf-8"?>
-<p:notes xmlns:a="http://schemas.openxmlformats.org/drawingml/2006/main" xmlns:r="http://schemas.openxmlformats.org/officeDocument/2006/relationships" xmlns:p="http://schemas.openxmlformats.org/presentationml/2006/main">
-  <p:cSld>
-    <p:spTree>
-      <p:nvGrpSpPr>
-        <p:cNvPr id="1" name=""/>
-        <p:cNvGrpSpPr/>
-        <p:nvPr/>
-      </p:nvGrpSpPr>
-      <p:grpSpPr>
-        <a:xfrm>
-          <a:off x="0" y="0"/>
-          <a:ext cx="0" cy="0"/>
-          <a:chOff x="0" y="0"/>
-          <a:chExt cx="0" cy="0"/>
-        </a:xfrm>
-      </p:grpSpPr>
-      <p:sp>
-        <p:nvSpPr>
-          <p:cNvPr id="2" name="Slide Image Placeholder 1"/>
-          <p:cNvSpPr>
-            <a:spLocks noGrp="1" noRot="1" noChangeAspect="1"/>
-          </p:cNvSpPr>
-          <p:nvPr>
-            <p:ph type="sldImg"/>
-          </p:nvPr>
-        </p:nvSpPr>
-        <p:spPr/>
-      </p:sp>
-      <p:sp>
-        <p:nvSpPr>
-          <p:cNvPr id="3" name="Notes Placeholder 2"/>
-          <p:cNvSpPr>
-            <a:spLocks noGrp="1"/>
-          </p:cNvSpPr>
-          <p:nvPr>
-            <p:ph type="body" idx="1"/>
-          </p:nvPr>
-        </p:nvSpPr>
-        <p:spPr/>
-        <p:txBody>
-          <a:bodyPr/>
-          <a:lstStyle/>
-          <a:p>
-            <a:r>
-              <a:rPr lang="en-US" sz="1200" b="0" i="0" kern="1200" dirty="0">
-                <a:solidFill>
-                  <a:schemeClr val="tx1"/>
-                </a:solidFill>
-                <a:effectLst/>
-                <a:latin typeface="+mn-lt"/>
-                <a:ea typeface="+mn-ea"/>
-                <a:cs typeface="+mn-cs"/>
-              </a:rPr>
-              <a:t>maximum alcoholic (ABV) beer? Colorado</a:t>
-            </a:r>
-          </a:p>
-          <a:p>
-            <a:r>
-              <a:rPr lang="en-US" sz="1200" b="0" i="0" kern="1200" dirty="0">
-                <a:solidFill>
-                  <a:schemeClr val="tx1"/>
-                </a:solidFill>
-                <a:effectLst/>
-                <a:latin typeface="+mn-lt"/>
-                <a:ea typeface="+mn-ea"/>
-                <a:cs typeface="+mn-cs"/>
-              </a:rPr>
-              <a:t>most bitter (IBU) beer? Oregon</a:t>
-            </a:r>
-          </a:p>
-          <a:p>
-            <a:endParaRPr lang="en-US" dirty="0"/>
-          </a:p>
-        </p:txBody>
-      </p:sp>
-      <p:sp>
-        <p:nvSpPr>
-          <p:cNvPr id="4" name="Slide Number Placeholder 3"/>
-          <p:cNvSpPr>
-            <a:spLocks noGrp="1"/>
-          </p:cNvSpPr>
-          <p:nvPr>
-            <p:ph type="sldNum" sz="quarter" idx="5"/>
-          </p:nvPr>
-        </p:nvSpPr>
-        <p:spPr/>
-        <p:txBody>
-          <a:bodyPr/>
-          <a:lstStyle/>
-          <a:p>
-            <a:fld id="{1B0D91D7-F22D-4CDC-8F75-E7F369B9B3B7}" type="slidenum">
-              <a:rPr lang="en-US" smtClean="0"/>
-              <a:t>21</a:t>
-            </a:fld>
-            <a:endParaRPr lang="en-US"/>
-          </a:p>
-        </p:txBody>
-      </p:sp>
-    </p:spTree>
-    <p:extLst>
-      <p:ext uri="{BB962C8B-B14F-4D97-AF65-F5344CB8AC3E}">
-        <p14:creationId xmlns:p14="http://schemas.microsoft.com/office/powerpoint/2010/main" val="2715228628"/>
-      </p:ext>
-    </p:extLst>
-  </p:cSld>
-  <p:clrMapOvr>
-    <a:masterClrMapping/>
-  </p:clrMapOvr>
-</p:notes>
-</file>
-
-<file path=ppt/notesSlides/notesSlide8.xml><?xml version="1.0" encoding="utf-8"?>
-<p:notes xmlns:a="http://schemas.openxmlformats.org/drawingml/2006/main" xmlns:r="http://schemas.openxmlformats.org/officeDocument/2006/relationships" xmlns:p="http://schemas.openxmlformats.org/presentationml/2006/main">
-  <p:cSld>
-    <p:spTree>
-      <p:nvGrpSpPr>
-        <p:cNvPr id="1" name=""/>
-        <p:cNvGrpSpPr/>
-        <p:nvPr/>
-      </p:nvGrpSpPr>
-      <p:grpSpPr>
-        <a:xfrm>
-          <a:off x="0" y="0"/>
-          <a:ext cx="0" cy="0"/>
-          <a:chOff x="0" y="0"/>
-          <a:chExt cx="0" cy="0"/>
-        </a:xfrm>
-      </p:grpSpPr>
-      <p:sp>
-        <p:nvSpPr>
-          <p:cNvPr id="2" name="Slide Image Placeholder 1"/>
-          <p:cNvSpPr>
-            <a:spLocks noGrp="1" noRot="1" noChangeAspect="1"/>
-          </p:cNvSpPr>
-          <p:nvPr>
-            <p:ph type="sldImg"/>
-          </p:nvPr>
-        </p:nvSpPr>
-        <p:spPr/>
-      </p:sp>
-      <p:sp>
-        <p:nvSpPr>
-          <p:cNvPr id="3" name="Notes Placeholder 2"/>
-          <p:cNvSpPr>
-            <a:spLocks noGrp="1"/>
-          </p:cNvSpPr>
-          <p:nvPr>
-            <p:ph type="body" idx="1"/>
-          </p:nvPr>
-        </p:nvSpPr>
-        <p:spPr/>
-        <p:txBody>
-          <a:bodyPr/>
-          <a:lstStyle/>
-          <a:p>
-            <a:r>
-              <a:rPr lang="en-US" dirty="0"/>
-              <a:t>This could be beneficial with the missingness of the IBU values as Alcohol by Volume could serve as a substitute.</a:t>
-            </a:r>
-          </a:p>
-          <a:p>
-            <a:endParaRPr lang="en-US" dirty="0"/>
-          </a:p>
-          <a:p>
-            <a:endParaRPr lang="en-US" dirty="0"/>
-          </a:p>
-        </p:txBody>
-      </p:sp>
-      <p:sp>
-        <p:nvSpPr>
-          <p:cNvPr id="4" name="Slide Number Placeholder 3"/>
-          <p:cNvSpPr>
-            <a:spLocks noGrp="1"/>
-          </p:cNvSpPr>
-          <p:nvPr>
-            <p:ph type="sldNum" sz="quarter" idx="5"/>
-          </p:nvPr>
-        </p:nvSpPr>
-        <p:spPr/>
-        <p:txBody>
-          <a:bodyPr/>
-          <a:lstStyle/>
-          <a:p>
-            <a:fld id="{1B0D91D7-F22D-4CDC-8F75-E7F369B9B3B7}" type="slidenum">
-              <a:rPr lang="en-US" smtClean="0"/>
-              <a:t>22</a:t>
-            </a:fld>
-            <a:endParaRPr lang="en-US"/>
-          </a:p>
-        </p:txBody>
-      </p:sp>
-    </p:spTree>
-    <p:extLst>
-      <p:ext uri="{BB962C8B-B14F-4D97-AF65-F5344CB8AC3E}">
-        <p14:creationId xmlns:p14="http://schemas.microsoft.com/office/powerpoint/2010/main" val="1838331574"/>
-      </p:ext>
-    </p:extLst>
-  </p:cSld>
-  <p:clrMapOvr>
-    <a:masterClrMapping/>
-  </p:clrMapOvr>
-</p:notes>
-</file>
-
-<file path=ppt/notesSlides/notesSlide9.xml><?xml version="1.0" encoding="utf-8"?>
-<p:notes xmlns:a="http://schemas.openxmlformats.org/drawingml/2006/main" xmlns:r="http://schemas.openxmlformats.org/officeDocument/2006/relationships" xmlns:p="http://schemas.openxmlformats.org/presentationml/2006/main">
-  <p:cSld>
-    <p:spTree>
-      <p:nvGrpSpPr>
-        <p:cNvPr id="1" name=""/>
-        <p:cNvGrpSpPr/>
-        <p:nvPr/>
-      </p:nvGrpSpPr>
-      <p:grpSpPr>
-        <a:xfrm>
-          <a:off x="0" y="0"/>
-          <a:ext cx="0" cy="0"/>
-          <a:chOff x="0" y="0"/>
-          <a:chExt cx="0" cy="0"/>
-        </a:xfrm>
-      </p:grpSpPr>
-      <p:sp>
-        <p:nvSpPr>
-          <p:cNvPr id="2" name="Slide Image Placeholder 1"/>
-          <p:cNvSpPr>
-            <a:spLocks noGrp="1" noRot="1" noChangeAspect="1"/>
-          </p:cNvSpPr>
-          <p:nvPr>
-            <p:ph type="sldImg"/>
-          </p:nvPr>
-        </p:nvSpPr>
-        <p:spPr/>
-      </p:sp>
-      <p:sp>
-        <p:nvSpPr>
-          <p:cNvPr id="3" name="Notes Placeholder 2"/>
-          <p:cNvSpPr>
-            <a:spLocks noGrp="1"/>
-          </p:cNvSpPr>
-          <p:nvPr>
-            <p:ph type="body" idx="1"/>
-          </p:nvPr>
-        </p:nvSpPr>
-        <p:spPr/>
-        <p:txBody>
-          <a:bodyPr/>
-          <a:lstStyle/>
-          <a:p>
-            <a:r>
-              <a:rPr lang="en-US" sz="1200" b="0" i="0" kern="1200" dirty="0">
-                <a:solidFill>
-                  <a:schemeClr val="tx1"/>
-                </a:solidFill>
-                <a:effectLst/>
-                <a:latin typeface="+mn-lt"/>
-                <a:ea typeface="+mn-ea"/>
-                <a:cs typeface="+mn-cs"/>
-              </a:rPr>
-              <a:t>he distribution of the ABV data is slightly right skewed, with most values falling within ~0.014 units of the mean of ~0.06.</a:t>
-            </a:r>
-            <a:endParaRPr lang="en-US" dirty="0"/>
-          </a:p>
-        </p:txBody>
-      </p:sp>
-      <p:sp>
-        <p:nvSpPr>
-          <p:cNvPr id="4" name="Slide Number Placeholder 3"/>
-          <p:cNvSpPr>
-            <a:spLocks noGrp="1"/>
-          </p:cNvSpPr>
-          <p:nvPr>
-            <p:ph type="sldNum" sz="quarter" idx="5"/>
-          </p:nvPr>
-        </p:nvSpPr>
-        <p:spPr/>
-        <p:txBody>
-          <a:bodyPr/>
-          <a:lstStyle/>
-          <a:p>
-            <a:fld id="{1B0D91D7-F22D-4CDC-8F75-E7F369B9B3B7}" type="slidenum">
-              <a:rPr lang="en-US" smtClean="0"/>
-              <a:t>23</a:t>
-            </a:fld>
-            <a:endParaRPr lang="en-US"/>
-          </a:p>
-        </p:txBody>
-      </p:sp>
-    </p:spTree>
-    <p:extLst>
-      <p:ext uri="{BB962C8B-B14F-4D97-AF65-F5344CB8AC3E}">
-        <p14:creationId xmlns:p14="http://schemas.microsoft.com/office/powerpoint/2010/main" val="903642149"/>
       </p:ext>
     </p:extLst>
   </p:cSld>
@@ -5408,7 +4874,7 @@
           <p:cNvPr id="2" name="Title 1">
             <a:extLst>
               <a:ext uri="{FF2B5EF4-FFF2-40B4-BE49-F238E27FC236}">
-                <a16:creationId xmlns:a16="http://schemas.microsoft.com/office/drawing/2014/main" id="{5B931770-76C9-F749-9B7D-08A4A1F13896}"/>
+                <a16:creationId xmlns:a16="http://schemas.microsoft.com/office/drawing/2014/main" id="{CCCE867A-C4F6-495A-B5B9-8ECEC8380CB6}"/>
               </a:ext>
             </a:extLst>
           </p:cNvPr>
@@ -5419,29 +4885,27 @@
             <p:ph type="title"/>
           </p:nvPr>
         </p:nvSpPr>
-        <p:spPr>
-          <a:xfrm>
-            <a:off x="0" y="228600"/>
-            <a:ext cx="9144000" cy="1143000"/>
-          </a:xfrm>
-        </p:spPr>
+        <p:spPr/>
         <p:txBody>
           <a:bodyPr/>
           <a:lstStyle/>
           <a:p>
             <a:r>
-              <a:rPr lang="en-US" dirty="0"/>
-              <a:t>Maximum Values by State (IBU)</a:t>
-            </a:r>
+              <a:rPr lang="en-US" dirty="0">
+                <a:cs typeface="Arial"/>
+              </a:rPr>
+              <a:t>Sreeni Stuff goes here</a:t>
+            </a:r>
+            <a:endParaRPr lang="en-US" dirty="0"/>
           </a:p>
         </p:txBody>
       </p:sp>
       <p:sp>
         <p:nvSpPr>
-          <p:cNvPr id="5" name="Content Placeholder 4">
+          <p:cNvPr id="3" name="Content Placeholder 2">
             <a:extLst>
               <a:ext uri="{FF2B5EF4-FFF2-40B4-BE49-F238E27FC236}">
-                <a16:creationId xmlns:a16="http://schemas.microsoft.com/office/drawing/2014/main" id="{375CDB98-7F05-41AD-9F29-81E3D0CFBEFF}"/>
+                <a16:creationId xmlns:a16="http://schemas.microsoft.com/office/drawing/2014/main" id="{D3B6111A-2981-4F16-A1AE-17B3B448F9C5}"/>
               </a:ext>
             </a:extLst>
           </p:cNvPr>
@@ -5452,96 +4916,19 @@
             <p:ph idx="1"/>
           </p:nvPr>
         </p:nvSpPr>
-        <p:spPr>
-          <a:xfrm>
-            <a:off x="457199" y="1627905"/>
-            <a:ext cx="8229600" cy="4854011"/>
-          </a:xfrm>
-        </p:spPr>
+        <p:spPr/>
         <p:txBody>
           <a:bodyPr/>
           <a:lstStyle/>
           <a:p>
-            <a:r>
-              <a:rPr lang="en-US" dirty="0"/>
-              <a:t>Similar differences can be seen across the IBU statistics</a:t>
-            </a:r>
-          </a:p>
-          <a:p>
-            <a:pPr marL="0" indent="0">
-              <a:buNone/>
-            </a:pPr>
-            <a:endParaRPr lang="en-US" dirty="0"/>
-          </a:p>
-          <a:p>
-            <a:endParaRPr lang="en-US" dirty="0"/>
-          </a:p>
-          <a:p>
-            <a:endParaRPr lang="en-US" dirty="0"/>
-          </a:p>
-          <a:p>
-            <a:endParaRPr lang="en-US" dirty="0"/>
-          </a:p>
-          <a:p>
-            <a:endParaRPr lang="en-US" dirty="0"/>
-          </a:p>
-          <a:p>
-            <a:endParaRPr lang="en-US" dirty="0"/>
-          </a:p>
-          <a:p>
-            <a:pPr marL="0" indent="0">
-              <a:buNone/>
-            </a:pPr>
-            <a:endParaRPr lang="en-US" sz="1600" i="1" dirty="0"/>
-          </a:p>
-          <a:p>
-            <a:pPr marL="0" indent="0">
-              <a:buNone/>
-            </a:pPr>
-            <a:endParaRPr lang="en-US" dirty="0"/>
-          </a:p>
-          <a:p>
-            <a:pPr marL="0" indent="0">
-              <a:buNone/>
-            </a:pPr>
-            <a:endParaRPr lang="en-US" dirty="0"/>
+            <a:endParaRPr lang="en-US"/>
           </a:p>
         </p:txBody>
       </p:sp>
-      <p:pic>
-        <p:nvPicPr>
-          <p:cNvPr id="3" name="Picture 2">
-            <a:extLst>
-              <a:ext uri="{FF2B5EF4-FFF2-40B4-BE49-F238E27FC236}">
-                <a16:creationId xmlns:a16="http://schemas.microsoft.com/office/drawing/2014/main" id="{7E916713-11CD-435D-9CAE-60765E7A5662}"/>
-              </a:ext>
-            </a:extLst>
-          </p:cNvPr>
-          <p:cNvPicPr>
-            <a:picLocks noChangeAspect="1"/>
-          </p:cNvPicPr>
-          <p:nvPr/>
-        </p:nvPicPr>
-        <p:blipFill>
-          <a:blip r:embed="rId2"/>
-          <a:stretch>
-            <a:fillRect/>
-          </a:stretch>
-        </p:blipFill>
-        <p:spPr>
-          <a:xfrm>
-            <a:off x="2296137" y="3182435"/>
-            <a:ext cx="4551726" cy="2047660"/>
-          </a:xfrm>
-          <a:prstGeom prst="rect">
-            <a:avLst/>
-          </a:prstGeom>
-        </p:spPr>
-      </p:pic>
     </p:spTree>
     <p:extLst>
       <p:ext uri="{BB962C8B-B14F-4D97-AF65-F5344CB8AC3E}">
-        <p14:creationId xmlns:p14="http://schemas.microsoft.com/office/powerpoint/2010/main" val="724258878"/>
+        <p14:creationId xmlns:p14="http://schemas.microsoft.com/office/powerpoint/2010/main" val="2533674786"/>
       </p:ext>
     </p:extLst>
   </p:cSld>
@@ -5568,1491 +4955,10 @@
           <a:chExt cx="0" cy="0"/>
         </a:xfrm>
       </p:grpSpPr>
-      <p:sp>
-        <p:nvSpPr>
-          <p:cNvPr id="2" name="Title 1">
-            <a:extLst>
-              <a:ext uri="{FF2B5EF4-FFF2-40B4-BE49-F238E27FC236}">
-                <a16:creationId xmlns:a16="http://schemas.microsoft.com/office/drawing/2014/main" id="{5B931770-76C9-F749-9B7D-08A4A1F13896}"/>
-              </a:ext>
-            </a:extLst>
-          </p:cNvPr>
-          <p:cNvSpPr>
-            <a:spLocks noGrp="1"/>
-          </p:cNvSpPr>
-          <p:nvPr>
-            <p:ph type="title"/>
-          </p:nvPr>
-        </p:nvSpPr>
-        <p:spPr>
-          <a:xfrm>
-            <a:off x="0" y="228600"/>
-            <a:ext cx="9144000" cy="1143000"/>
-          </a:xfrm>
-        </p:spPr>
-        <p:txBody>
-          <a:bodyPr/>
-          <a:lstStyle/>
-          <a:p>
-            <a:r>
-              <a:rPr lang="en-US" dirty="0"/>
-              <a:t>Data Sets and Definitions</a:t>
-            </a:r>
-          </a:p>
-        </p:txBody>
-      </p:sp>
-      <p:sp>
-        <p:nvSpPr>
-          <p:cNvPr id="5" name="Content Placeholder 4">
-            <a:extLst>
-              <a:ext uri="{FF2B5EF4-FFF2-40B4-BE49-F238E27FC236}">
-                <a16:creationId xmlns:a16="http://schemas.microsoft.com/office/drawing/2014/main" id="{375CDB98-7F05-41AD-9F29-81E3D0CFBEFF}"/>
-              </a:ext>
-            </a:extLst>
-          </p:cNvPr>
-          <p:cNvSpPr>
-            <a:spLocks noGrp="1"/>
-          </p:cNvSpPr>
-          <p:nvPr>
-            <p:ph idx="1"/>
-          </p:nvPr>
-        </p:nvSpPr>
-        <p:spPr>
-          <a:xfrm>
-            <a:off x="1084006" y="2148682"/>
-            <a:ext cx="2455607" cy="672843"/>
-          </a:xfrm>
-        </p:spPr>
-        <p:txBody>
-          <a:bodyPr/>
-          <a:lstStyle/>
-          <a:p>
-            <a:pPr marL="0" indent="0" algn="ctr">
-              <a:buNone/>
-            </a:pPr>
-            <a:r>
-              <a:rPr lang="en-US" dirty="0"/>
-              <a:t>Beers</a:t>
-            </a:r>
-          </a:p>
-          <a:p>
-            <a:pPr marL="0" indent="0">
-              <a:buNone/>
-            </a:pPr>
-            <a:endParaRPr lang="en-US" dirty="0"/>
-          </a:p>
-          <a:p>
-            <a:endParaRPr lang="en-US" dirty="0"/>
-          </a:p>
-          <a:p>
-            <a:endParaRPr lang="en-US" dirty="0"/>
-          </a:p>
-          <a:p>
-            <a:endParaRPr lang="en-US" dirty="0"/>
-          </a:p>
-          <a:p>
-            <a:endParaRPr lang="en-US" dirty="0"/>
-          </a:p>
-          <a:p>
-            <a:pPr marL="0" indent="0">
-              <a:buNone/>
-            </a:pPr>
-            <a:endParaRPr lang="en-US" dirty="0"/>
-          </a:p>
-        </p:txBody>
-      </p:sp>
-      <p:pic>
-        <p:nvPicPr>
-          <p:cNvPr id="3" name="Picture 2">
-            <a:extLst>
-              <a:ext uri="{FF2B5EF4-FFF2-40B4-BE49-F238E27FC236}">
-                <a16:creationId xmlns:a16="http://schemas.microsoft.com/office/drawing/2014/main" id="{144A0483-CFE7-4D0B-9162-730F48F7B7F4}"/>
-              </a:ext>
-            </a:extLst>
-          </p:cNvPr>
-          <p:cNvPicPr>
-            <a:picLocks noChangeAspect="1"/>
-          </p:cNvPicPr>
-          <p:nvPr/>
-        </p:nvPicPr>
-        <p:blipFill>
-          <a:blip r:embed="rId3"/>
-          <a:stretch>
-            <a:fillRect/>
-          </a:stretch>
-        </p:blipFill>
-        <p:spPr>
-          <a:xfrm>
-            <a:off x="221225" y="2821525"/>
-            <a:ext cx="4181170" cy="2581468"/>
-          </a:xfrm>
-          <a:prstGeom prst="rect">
-            <a:avLst/>
-          </a:prstGeom>
-        </p:spPr>
-      </p:pic>
-      <p:pic>
-        <p:nvPicPr>
-          <p:cNvPr id="4" name="Picture 3">
-            <a:extLst>
-              <a:ext uri="{FF2B5EF4-FFF2-40B4-BE49-F238E27FC236}">
-                <a16:creationId xmlns:a16="http://schemas.microsoft.com/office/drawing/2014/main" id="{DC96259F-E6CE-4B04-9F81-522004CCF1CE}"/>
-              </a:ext>
-            </a:extLst>
-          </p:cNvPr>
-          <p:cNvPicPr>
-            <a:picLocks noChangeAspect="1"/>
-          </p:cNvPicPr>
-          <p:nvPr/>
-        </p:nvPicPr>
-        <p:blipFill>
-          <a:blip r:embed="rId4"/>
-          <a:stretch>
-            <a:fillRect/>
-          </a:stretch>
-        </p:blipFill>
-        <p:spPr>
-          <a:xfrm>
-            <a:off x="4741606" y="2821525"/>
-            <a:ext cx="4223107" cy="1715061"/>
-          </a:xfrm>
-          <a:prstGeom prst="rect">
-            <a:avLst/>
-          </a:prstGeom>
-        </p:spPr>
-      </p:pic>
-      <p:sp>
-        <p:nvSpPr>
-          <p:cNvPr id="8" name="Content Placeholder 4">
-            <a:extLst>
-              <a:ext uri="{FF2B5EF4-FFF2-40B4-BE49-F238E27FC236}">
-                <a16:creationId xmlns:a16="http://schemas.microsoft.com/office/drawing/2014/main" id="{BBBA70E4-5DB7-4EDB-9C20-ED3B83ABB498}"/>
-              </a:ext>
-            </a:extLst>
-          </p:cNvPr>
-          <p:cNvSpPr txBox="1">
-            <a:spLocks/>
-          </p:cNvSpPr>
-          <p:nvPr/>
-        </p:nvSpPr>
-        <p:spPr>
-          <a:xfrm>
-            <a:off x="5625355" y="2172263"/>
-            <a:ext cx="2455607" cy="672843"/>
-          </a:xfrm>
-          <a:prstGeom prst="rect">
-            <a:avLst/>
-          </a:prstGeom>
-        </p:spPr>
-        <p:txBody>
-          <a:bodyPr vert="horz" lIns="91440" tIns="45720" rIns="91440" bIns="45720" rtlCol="0">
-            <a:noAutofit/>
-          </a:bodyPr>
-          <a:lstStyle>
-            <a:lvl1pPr marL="342900" indent="-342900" algn="l" defTabSz="914400" rtl="0" eaLnBrk="1" latinLnBrk="0" hangingPunct="1">
-              <a:spcBef>
-                <a:spcPts val="600"/>
-              </a:spcBef>
-              <a:buFont typeface="Arial" charset="0"/>
-              <a:buChar char="•"/>
-              <a:defRPr sz="3200" kern="1200">
-                <a:solidFill>
-                  <a:schemeClr val="tx1"/>
-                </a:solidFill>
-                <a:latin typeface="+mn-lt"/>
-                <a:ea typeface="+mn-ea"/>
-                <a:cs typeface="+mn-cs"/>
-              </a:defRPr>
-            </a:lvl1pPr>
-            <a:lvl2pPr marL="742950" indent="-285750" algn="l" defTabSz="914400" rtl="0" eaLnBrk="1" latinLnBrk="0" hangingPunct="1">
-              <a:spcBef>
-                <a:spcPts val="600"/>
-              </a:spcBef>
-              <a:buFont typeface="Arial" charset="0"/>
-              <a:buChar char="•"/>
-              <a:defRPr sz="2800" b="0" i="0" u="none" kern="1200">
-                <a:solidFill>
-                  <a:schemeClr val="tx1"/>
-                </a:solidFill>
-                <a:latin typeface="+mn-lt"/>
-                <a:ea typeface="+mn-ea"/>
-                <a:cs typeface="+mn-cs"/>
-              </a:defRPr>
-            </a:lvl2pPr>
-            <a:lvl3pPr marL="1143000" indent="-228600" algn="l" defTabSz="914400" rtl="0" eaLnBrk="1" latinLnBrk="0" hangingPunct="1">
-              <a:spcBef>
-                <a:spcPts val="600"/>
-              </a:spcBef>
-              <a:buFont typeface="Arial" charset="0"/>
-              <a:buChar char="•"/>
-              <a:defRPr sz="2400" kern="1200">
-                <a:solidFill>
-                  <a:schemeClr val="tx1"/>
-                </a:solidFill>
-                <a:latin typeface="+mn-lt"/>
-                <a:ea typeface="+mn-ea"/>
-                <a:cs typeface="+mn-cs"/>
-              </a:defRPr>
-            </a:lvl3pPr>
-            <a:lvl4pPr marL="1600200" indent="-228600" algn="l" defTabSz="914400" rtl="0" eaLnBrk="1" latinLnBrk="0" hangingPunct="1">
-              <a:spcBef>
-                <a:spcPts val="600"/>
-              </a:spcBef>
-              <a:buFont typeface="Arial" charset="0"/>
-              <a:buChar char="•"/>
-              <a:defRPr sz="2000" kern="1200">
-                <a:solidFill>
-                  <a:schemeClr val="tx1"/>
-                </a:solidFill>
-                <a:latin typeface="+mn-lt"/>
-                <a:ea typeface="+mn-ea"/>
-                <a:cs typeface="+mn-cs"/>
-              </a:defRPr>
-            </a:lvl4pPr>
-            <a:lvl5pPr marL="2057400" indent="-228600" algn="l" defTabSz="914400" rtl="0" eaLnBrk="1" latinLnBrk="0" hangingPunct="1">
-              <a:spcBef>
-                <a:spcPts val="600"/>
-              </a:spcBef>
-              <a:buFont typeface="Arial" charset="0"/>
-              <a:buChar char="•"/>
-              <a:defRPr sz="2000" kern="1200">
-                <a:solidFill>
-                  <a:schemeClr val="tx1"/>
-                </a:solidFill>
-                <a:latin typeface="+mn-lt"/>
-                <a:ea typeface="+mn-ea"/>
-                <a:cs typeface="+mn-cs"/>
-              </a:defRPr>
-            </a:lvl5pPr>
-            <a:lvl6pPr marL="2514600" indent="-228600" algn="l" defTabSz="914400" rtl="0" eaLnBrk="1" latinLnBrk="0" hangingPunct="1">
-              <a:spcBef>
-                <a:spcPct val="20000"/>
-              </a:spcBef>
-              <a:buFont typeface="Arial" panose="020B0604020202020204" pitchFamily="34" charset="0"/>
-              <a:buChar char="•"/>
-              <a:defRPr sz="2000" kern="1200">
-                <a:solidFill>
-                  <a:schemeClr val="tx1"/>
-                </a:solidFill>
-                <a:latin typeface="+mn-lt"/>
-                <a:ea typeface="+mn-ea"/>
-                <a:cs typeface="+mn-cs"/>
-              </a:defRPr>
-            </a:lvl6pPr>
-            <a:lvl7pPr marL="2971800" indent="-228600" algn="l" defTabSz="914400" rtl="0" eaLnBrk="1" latinLnBrk="0" hangingPunct="1">
-              <a:spcBef>
-                <a:spcPct val="20000"/>
-              </a:spcBef>
-              <a:buFont typeface="Arial" panose="020B0604020202020204" pitchFamily="34" charset="0"/>
-              <a:buChar char="•"/>
-              <a:defRPr sz="2000" kern="1200">
-                <a:solidFill>
-                  <a:schemeClr val="tx1"/>
-                </a:solidFill>
-                <a:latin typeface="+mn-lt"/>
-                <a:ea typeface="+mn-ea"/>
-                <a:cs typeface="+mn-cs"/>
-              </a:defRPr>
-            </a:lvl7pPr>
-            <a:lvl8pPr marL="3429000" indent="-228600" algn="l" defTabSz="914400" rtl="0" eaLnBrk="1" latinLnBrk="0" hangingPunct="1">
-              <a:spcBef>
-                <a:spcPct val="20000"/>
-              </a:spcBef>
-              <a:buFont typeface="Arial" panose="020B0604020202020204" pitchFamily="34" charset="0"/>
-              <a:buChar char="•"/>
-              <a:defRPr sz="2000" kern="1200">
-                <a:solidFill>
-                  <a:schemeClr val="tx1"/>
-                </a:solidFill>
-                <a:latin typeface="+mn-lt"/>
-                <a:ea typeface="+mn-ea"/>
-                <a:cs typeface="+mn-cs"/>
-              </a:defRPr>
-            </a:lvl8pPr>
-            <a:lvl9pPr marL="3886200" indent="-228600" algn="l" defTabSz="914400" rtl="0" eaLnBrk="1" latinLnBrk="0" hangingPunct="1">
-              <a:spcBef>
-                <a:spcPct val="20000"/>
-              </a:spcBef>
-              <a:buFont typeface="Arial" panose="020B0604020202020204" pitchFamily="34" charset="0"/>
-              <a:buChar char="•"/>
-              <a:defRPr sz="2000" kern="1200">
-                <a:solidFill>
-                  <a:schemeClr val="tx1"/>
-                </a:solidFill>
-                <a:latin typeface="+mn-lt"/>
-                <a:ea typeface="+mn-ea"/>
-                <a:cs typeface="+mn-cs"/>
-              </a:defRPr>
-            </a:lvl9pPr>
-          </a:lstStyle>
-          <a:p>
-            <a:pPr marL="0" indent="0" algn="ctr">
-              <a:buFont typeface="Arial" charset="0"/>
-              <a:buNone/>
-            </a:pPr>
-            <a:r>
-              <a:rPr lang="en-US" dirty="0"/>
-              <a:t>Breweries</a:t>
-            </a:r>
-          </a:p>
-          <a:p>
-            <a:pPr marL="0" indent="0">
-              <a:buFont typeface="Arial" charset="0"/>
-              <a:buNone/>
-            </a:pPr>
-            <a:endParaRPr lang="en-US" dirty="0"/>
-          </a:p>
-          <a:p>
-            <a:endParaRPr lang="en-US" dirty="0"/>
-          </a:p>
-          <a:p>
-            <a:endParaRPr lang="en-US" dirty="0"/>
-          </a:p>
-          <a:p>
-            <a:endParaRPr lang="en-US" dirty="0"/>
-          </a:p>
-          <a:p>
-            <a:endParaRPr lang="en-US" dirty="0"/>
-          </a:p>
-          <a:p>
-            <a:pPr marL="0" indent="0">
-              <a:buFont typeface="Arial" charset="0"/>
-              <a:buNone/>
-            </a:pPr>
-            <a:endParaRPr lang="en-US" dirty="0"/>
-          </a:p>
-        </p:txBody>
-      </p:sp>
-      <p:sp>
-        <p:nvSpPr>
-          <p:cNvPr id="7" name="Content Placeholder 4">
-            <a:extLst>
-              <a:ext uri="{FF2B5EF4-FFF2-40B4-BE49-F238E27FC236}">
-                <a16:creationId xmlns:a16="http://schemas.microsoft.com/office/drawing/2014/main" id="{2FC15A3F-ACC5-4C6F-82AA-3766F8873C78}"/>
-              </a:ext>
-            </a:extLst>
-          </p:cNvPr>
-          <p:cNvSpPr txBox="1">
-            <a:spLocks/>
-          </p:cNvSpPr>
-          <p:nvPr/>
-        </p:nvSpPr>
-        <p:spPr>
-          <a:xfrm>
-            <a:off x="2395960" y="5402993"/>
-            <a:ext cx="2006436" cy="349625"/>
-          </a:xfrm>
-          <a:prstGeom prst="rect">
-            <a:avLst/>
-          </a:prstGeom>
-        </p:spPr>
-        <p:txBody>
-          <a:bodyPr vert="horz" lIns="91440" tIns="45720" rIns="91440" bIns="45720" rtlCol="0">
-            <a:noAutofit/>
-          </a:bodyPr>
-          <a:lstStyle>
-            <a:lvl1pPr marL="342900" indent="-342900" algn="l" defTabSz="914400" rtl="0" eaLnBrk="1" latinLnBrk="0" hangingPunct="1">
-              <a:spcBef>
-                <a:spcPts val="600"/>
-              </a:spcBef>
-              <a:buFont typeface="Arial" charset="0"/>
-              <a:buChar char="•"/>
-              <a:defRPr sz="3200" kern="1200">
-                <a:solidFill>
-                  <a:schemeClr val="tx1"/>
-                </a:solidFill>
-                <a:latin typeface="+mn-lt"/>
-                <a:ea typeface="+mn-ea"/>
-                <a:cs typeface="+mn-cs"/>
-              </a:defRPr>
-            </a:lvl1pPr>
-            <a:lvl2pPr marL="742950" indent="-285750" algn="l" defTabSz="914400" rtl="0" eaLnBrk="1" latinLnBrk="0" hangingPunct="1">
-              <a:spcBef>
-                <a:spcPts val="600"/>
-              </a:spcBef>
-              <a:buFont typeface="Arial" charset="0"/>
-              <a:buChar char="•"/>
-              <a:defRPr sz="2800" b="0" i="0" u="none" kern="1200">
-                <a:solidFill>
-                  <a:schemeClr val="tx1"/>
-                </a:solidFill>
-                <a:latin typeface="+mn-lt"/>
-                <a:ea typeface="+mn-ea"/>
-                <a:cs typeface="+mn-cs"/>
-              </a:defRPr>
-            </a:lvl2pPr>
-            <a:lvl3pPr marL="1143000" indent="-228600" algn="l" defTabSz="914400" rtl="0" eaLnBrk="1" latinLnBrk="0" hangingPunct="1">
-              <a:spcBef>
-                <a:spcPts val="600"/>
-              </a:spcBef>
-              <a:buFont typeface="Arial" charset="0"/>
-              <a:buChar char="•"/>
-              <a:defRPr sz="2400" kern="1200">
-                <a:solidFill>
-                  <a:schemeClr val="tx1"/>
-                </a:solidFill>
-                <a:latin typeface="+mn-lt"/>
-                <a:ea typeface="+mn-ea"/>
-                <a:cs typeface="+mn-cs"/>
-              </a:defRPr>
-            </a:lvl3pPr>
-            <a:lvl4pPr marL="1600200" indent="-228600" algn="l" defTabSz="914400" rtl="0" eaLnBrk="1" latinLnBrk="0" hangingPunct="1">
-              <a:spcBef>
-                <a:spcPts val="600"/>
-              </a:spcBef>
-              <a:buFont typeface="Arial" charset="0"/>
-              <a:buChar char="•"/>
-              <a:defRPr sz="2000" kern="1200">
-                <a:solidFill>
-                  <a:schemeClr val="tx1"/>
-                </a:solidFill>
-                <a:latin typeface="+mn-lt"/>
-                <a:ea typeface="+mn-ea"/>
-                <a:cs typeface="+mn-cs"/>
-              </a:defRPr>
-            </a:lvl4pPr>
-            <a:lvl5pPr marL="2057400" indent="-228600" algn="l" defTabSz="914400" rtl="0" eaLnBrk="1" latinLnBrk="0" hangingPunct="1">
-              <a:spcBef>
-                <a:spcPts val="600"/>
-              </a:spcBef>
-              <a:buFont typeface="Arial" charset="0"/>
-              <a:buChar char="•"/>
-              <a:defRPr sz="2000" kern="1200">
-                <a:solidFill>
-                  <a:schemeClr val="tx1"/>
-                </a:solidFill>
-                <a:latin typeface="+mn-lt"/>
-                <a:ea typeface="+mn-ea"/>
-                <a:cs typeface="+mn-cs"/>
-              </a:defRPr>
-            </a:lvl5pPr>
-            <a:lvl6pPr marL="2514600" indent="-228600" algn="l" defTabSz="914400" rtl="0" eaLnBrk="1" latinLnBrk="0" hangingPunct="1">
-              <a:spcBef>
-                <a:spcPct val="20000"/>
-              </a:spcBef>
-              <a:buFont typeface="Arial" panose="020B0604020202020204" pitchFamily="34" charset="0"/>
-              <a:buChar char="•"/>
-              <a:defRPr sz="2000" kern="1200">
-                <a:solidFill>
-                  <a:schemeClr val="tx1"/>
-                </a:solidFill>
-                <a:latin typeface="+mn-lt"/>
-                <a:ea typeface="+mn-ea"/>
-                <a:cs typeface="+mn-cs"/>
-              </a:defRPr>
-            </a:lvl6pPr>
-            <a:lvl7pPr marL="2971800" indent="-228600" algn="l" defTabSz="914400" rtl="0" eaLnBrk="1" latinLnBrk="0" hangingPunct="1">
-              <a:spcBef>
-                <a:spcPct val="20000"/>
-              </a:spcBef>
-              <a:buFont typeface="Arial" panose="020B0604020202020204" pitchFamily="34" charset="0"/>
-              <a:buChar char="•"/>
-              <a:defRPr sz="2000" kern="1200">
-                <a:solidFill>
-                  <a:schemeClr val="tx1"/>
-                </a:solidFill>
-                <a:latin typeface="+mn-lt"/>
-                <a:ea typeface="+mn-ea"/>
-                <a:cs typeface="+mn-cs"/>
-              </a:defRPr>
-            </a:lvl7pPr>
-            <a:lvl8pPr marL="3429000" indent="-228600" algn="l" defTabSz="914400" rtl="0" eaLnBrk="1" latinLnBrk="0" hangingPunct="1">
-              <a:spcBef>
-                <a:spcPct val="20000"/>
-              </a:spcBef>
-              <a:buFont typeface="Arial" panose="020B0604020202020204" pitchFamily="34" charset="0"/>
-              <a:buChar char="•"/>
-              <a:defRPr sz="2000" kern="1200">
-                <a:solidFill>
-                  <a:schemeClr val="tx1"/>
-                </a:solidFill>
-                <a:latin typeface="+mn-lt"/>
-                <a:ea typeface="+mn-ea"/>
-                <a:cs typeface="+mn-cs"/>
-              </a:defRPr>
-            </a:lvl8pPr>
-            <a:lvl9pPr marL="3886200" indent="-228600" algn="l" defTabSz="914400" rtl="0" eaLnBrk="1" latinLnBrk="0" hangingPunct="1">
-              <a:spcBef>
-                <a:spcPct val="20000"/>
-              </a:spcBef>
-              <a:buFont typeface="Arial" panose="020B0604020202020204" pitchFamily="34" charset="0"/>
-              <a:buChar char="•"/>
-              <a:defRPr sz="2000" kern="1200">
-                <a:solidFill>
-                  <a:schemeClr val="tx1"/>
-                </a:solidFill>
-                <a:latin typeface="+mn-lt"/>
-                <a:ea typeface="+mn-ea"/>
-                <a:cs typeface="+mn-cs"/>
-              </a:defRPr>
-            </a:lvl9pPr>
-          </a:lstStyle>
-          <a:p>
-            <a:pPr marL="0" indent="0" algn="ctr">
-              <a:buFont typeface="Arial" charset="0"/>
-              <a:buNone/>
-            </a:pPr>
-            <a:r>
-              <a:rPr lang="en-US" sz="1200" b="1" i="1" dirty="0"/>
-              <a:t>2,410 US Craft Beers</a:t>
-            </a:r>
-          </a:p>
-          <a:p>
-            <a:pPr marL="0" indent="0">
-              <a:buFont typeface="Arial" charset="0"/>
-              <a:buNone/>
-            </a:pPr>
-            <a:endParaRPr lang="en-US" sz="1200" dirty="0"/>
-          </a:p>
-          <a:p>
-            <a:endParaRPr lang="en-US" dirty="0"/>
-          </a:p>
-          <a:p>
-            <a:endParaRPr lang="en-US" dirty="0"/>
-          </a:p>
-          <a:p>
-            <a:endParaRPr lang="en-US" dirty="0"/>
-          </a:p>
-          <a:p>
-            <a:endParaRPr lang="en-US" dirty="0"/>
-          </a:p>
-          <a:p>
-            <a:pPr marL="0" indent="0">
-              <a:buFont typeface="Arial" charset="0"/>
-              <a:buNone/>
-            </a:pPr>
-            <a:endParaRPr lang="en-US" i="1" dirty="0"/>
-          </a:p>
-        </p:txBody>
-      </p:sp>
-      <p:sp>
-        <p:nvSpPr>
-          <p:cNvPr id="9" name="Content Placeholder 4">
-            <a:extLst>
-              <a:ext uri="{FF2B5EF4-FFF2-40B4-BE49-F238E27FC236}">
-                <a16:creationId xmlns:a16="http://schemas.microsoft.com/office/drawing/2014/main" id="{02F22577-FF19-4B6D-89D9-CFD9B2D65986}"/>
-              </a:ext>
-            </a:extLst>
-          </p:cNvPr>
-          <p:cNvSpPr txBox="1">
-            <a:spLocks/>
-          </p:cNvSpPr>
-          <p:nvPr/>
-        </p:nvSpPr>
-        <p:spPr>
-          <a:xfrm>
-            <a:off x="7581417" y="4582430"/>
-            <a:ext cx="1383295" cy="349625"/>
-          </a:xfrm>
-          <a:prstGeom prst="rect">
-            <a:avLst/>
-          </a:prstGeom>
-        </p:spPr>
-        <p:txBody>
-          <a:bodyPr vert="horz" lIns="91440" tIns="45720" rIns="91440" bIns="45720" rtlCol="0">
-            <a:noAutofit/>
-          </a:bodyPr>
-          <a:lstStyle>
-            <a:lvl1pPr marL="342900" indent="-342900" algn="l" defTabSz="914400" rtl="0" eaLnBrk="1" latinLnBrk="0" hangingPunct="1">
-              <a:spcBef>
-                <a:spcPts val="600"/>
-              </a:spcBef>
-              <a:buFont typeface="Arial" charset="0"/>
-              <a:buChar char="•"/>
-              <a:defRPr sz="3200" kern="1200">
-                <a:solidFill>
-                  <a:schemeClr val="tx1"/>
-                </a:solidFill>
-                <a:latin typeface="+mn-lt"/>
-                <a:ea typeface="+mn-ea"/>
-                <a:cs typeface="+mn-cs"/>
-              </a:defRPr>
-            </a:lvl1pPr>
-            <a:lvl2pPr marL="742950" indent="-285750" algn="l" defTabSz="914400" rtl="0" eaLnBrk="1" latinLnBrk="0" hangingPunct="1">
-              <a:spcBef>
-                <a:spcPts val="600"/>
-              </a:spcBef>
-              <a:buFont typeface="Arial" charset="0"/>
-              <a:buChar char="•"/>
-              <a:defRPr sz="2800" b="0" i="0" u="none" kern="1200">
-                <a:solidFill>
-                  <a:schemeClr val="tx1"/>
-                </a:solidFill>
-                <a:latin typeface="+mn-lt"/>
-                <a:ea typeface="+mn-ea"/>
-                <a:cs typeface="+mn-cs"/>
-              </a:defRPr>
-            </a:lvl2pPr>
-            <a:lvl3pPr marL="1143000" indent="-228600" algn="l" defTabSz="914400" rtl="0" eaLnBrk="1" latinLnBrk="0" hangingPunct="1">
-              <a:spcBef>
-                <a:spcPts val="600"/>
-              </a:spcBef>
-              <a:buFont typeface="Arial" charset="0"/>
-              <a:buChar char="•"/>
-              <a:defRPr sz="2400" kern="1200">
-                <a:solidFill>
-                  <a:schemeClr val="tx1"/>
-                </a:solidFill>
-                <a:latin typeface="+mn-lt"/>
-                <a:ea typeface="+mn-ea"/>
-                <a:cs typeface="+mn-cs"/>
-              </a:defRPr>
-            </a:lvl3pPr>
-            <a:lvl4pPr marL="1600200" indent="-228600" algn="l" defTabSz="914400" rtl="0" eaLnBrk="1" latinLnBrk="0" hangingPunct="1">
-              <a:spcBef>
-                <a:spcPts val="600"/>
-              </a:spcBef>
-              <a:buFont typeface="Arial" charset="0"/>
-              <a:buChar char="•"/>
-              <a:defRPr sz="2000" kern="1200">
-                <a:solidFill>
-                  <a:schemeClr val="tx1"/>
-                </a:solidFill>
-                <a:latin typeface="+mn-lt"/>
-                <a:ea typeface="+mn-ea"/>
-                <a:cs typeface="+mn-cs"/>
-              </a:defRPr>
-            </a:lvl4pPr>
-            <a:lvl5pPr marL="2057400" indent="-228600" algn="l" defTabSz="914400" rtl="0" eaLnBrk="1" latinLnBrk="0" hangingPunct="1">
-              <a:spcBef>
-                <a:spcPts val="600"/>
-              </a:spcBef>
-              <a:buFont typeface="Arial" charset="0"/>
-              <a:buChar char="•"/>
-              <a:defRPr sz="2000" kern="1200">
-                <a:solidFill>
-                  <a:schemeClr val="tx1"/>
-                </a:solidFill>
-                <a:latin typeface="+mn-lt"/>
-                <a:ea typeface="+mn-ea"/>
-                <a:cs typeface="+mn-cs"/>
-              </a:defRPr>
-            </a:lvl5pPr>
-            <a:lvl6pPr marL="2514600" indent="-228600" algn="l" defTabSz="914400" rtl="0" eaLnBrk="1" latinLnBrk="0" hangingPunct="1">
-              <a:spcBef>
-                <a:spcPct val="20000"/>
-              </a:spcBef>
-              <a:buFont typeface="Arial" panose="020B0604020202020204" pitchFamily="34" charset="0"/>
-              <a:buChar char="•"/>
-              <a:defRPr sz="2000" kern="1200">
-                <a:solidFill>
-                  <a:schemeClr val="tx1"/>
-                </a:solidFill>
-                <a:latin typeface="+mn-lt"/>
-                <a:ea typeface="+mn-ea"/>
-                <a:cs typeface="+mn-cs"/>
-              </a:defRPr>
-            </a:lvl6pPr>
-            <a:lvl7pPr marL="2971800" indent="-228600" algn="l" defTabSz="914400" rtl="0" eaLnBrk="1" latinLnBrk="0" hangingPunct="1">
-              <a:spcBef>
-                <a:spcPct val="20000"/>
-              </a:spcBef>
-              <a:buFont typeface="Arial" panose="020B0604020202020204" pitchFamily="34" charset="0"/>
-              <a:buChar char="•"/>
-              <a:defRPr sz="2000" kern="1200">
-                <a:solidFill>
-                  <a:schemeClr val="tx1"/>
-                </a:solidFill>
-                <a:latin typeface="+mn-lt"/>
-                <a:ea typeface="+mn-ea"/>
-                <a:cs typeface="+mn-cs"/>
-              </a:defRPr>
-            </a:lvl7pPr>
-            <a:lvl8pPr marL="3429000" indent="-228600" algn="l" defTabSz="914400" rtl="0" eaLnBrk="1" latinLnBrk="0" hangingPunct="1">
-              <a:spcBef>
-                <a:spcPct val="20000"/>
-              </a:spcBef>
-              <a:buFont typeface="Arial" panose="020B0604020202020204" pitchFamily="34" charset="0"/>
-              <a:buChar char="•"/>
-              <a:defRPr sz="2000" kern="1200">
-                <a:solidFill>
-                  <a:schemeClr val="tx1"/>
-                </a:solidFill>
-                <a:latin typeface="+mn-lt"/>
-                <a:ea typeface="+mn-ea"/>
-                <a:cs typeface="+mn-cs"/>
-              </a:defRPr>
-            </a:lvl8pPr>
-            <a:lvl9pPr marL="3886200" indent="-228600" algn="l" defTabSz="914400" rtl="0" eaLnBrk="1" latinLnBrk="0" hangingPunct="1">
-              <a:spcBef>
-                <a:spcPct val="20000"/>
-              </a:spcBef>
-              <a:buFont typeface="Arial" panose="020B0604020202020204" pitchFamily="34" charset="0"/>
-              <a:buChar char="•"/>
-              <a:defRPr sz="2000" kern="1200">
-                <a:solidFill>
-                  <a:schemeClr val="tx1"/>
-                </a:solidFill>
-                <a:latin typeface="+mn-lt"/>
-                <a:ea typeface="+mn-ea"/>
-                <a:cs typeface="+mn-cs"/>
-              </a:defRPr>
-            </a:lvl9pPr>
-          </a:lstStyle>
-          <a:p>
-            <a:pPr marL="0" indent="0" algn="ctr">
-              <a:buFont typeface="Arial" charset="0"/>
-              <a:buNone/>
-            </a:pPr>
-            <a:r>
-              <a:rPr lang="en-US" sz="1200" b="1" i="1" dirty="0"/>
-              <a:t>558 Breweries</a:t>
-            </a:r>
-          </a:p>
-          <a:p>
-            <a:pPr marL="0" indent="0">
-              <a:buFont typeface="Arial" charset="0"/>
-              <a:buNone/>
-            </a:pPr>
-            <a:endParaRPr lang="en-US" dirty="0"/>
-          </a:p>
-          <a:p>
-            <a:endParaRPr lang="en-US" dirty="0"/>
-          </a:p>
-          <a:p>
-            <a:endParaRPr lang="en-US" dirty="0"/>
-          </a:p>
-          <a:p>
-            <a:endParaRPr lang="en-US" dirty="0"/>
-          </a:p>
-          <a:p>
-            <a:endParaRPr lang="en-US" dirty="0"/>
-          </a:p>
-          <a:p>
-            <a:pPr marL="0" indent="0">
-              <a:buFont typeface="Arial" charset="0"/>
-              <a:buNone/>
-            </a:pPr>
-            <a:endParaRPr lang="en-US" i="1" dirty="0"/>
-          </a:p>
-        </p:txBody>
-      </p:sp>
     </p:spTree>
     <p:extLst>
       <p:ext uri="{BB962C8B-B14F-4D97-AF65-F5344CB8AC3E}">
-        <p14:creationId xmlns:p14="http://schemas.microsoft.com/office/powerpoint/2010/main" val="170715436"/>
-      </p:ext>
-    </p:extLst>
-  </p:cSld>
-  <p:clrMapOvr>
-    <a:masterClrMapping/>
-  </p:clrMapOvr>
-</p:sld>
-</file>
-
-<file path=ppt/slides/slide17.xml><?xml version="1.0" encoding="utf-8"?>
-<p:sld xmlns:a="http://schemas.openxmlformats.org/drawingml/2006/main" xmlns:r="http://schemas.openxmlformats.org/officeDocument/2006/relationships" xmlns:p="http://schemas.openxmlformats.org/presentationml/2006/main">
-  <p:cSld>
-    <p:spTree>
-      <p:nvGrpSpPr>
-        <p:cNvPr id="1" name=""/>
-        <p:cNvGrpSpPr/>
-        <p:nvPr/>
-      </p:nvGrpSpPr>
-      <p:grpSpPr>
-        <a:xfrm>
-          <a:off x="0" y="0"/>
-          <a:ext cx="0" cy="0"/>
-          <a:chOff x="0" y="0"/>
-          <a:chExt cx="0" cy="0"/>
-        </a:xfrm>
-      </p:grpSpPr>
-      <p:sp>
-        <p:nvSpPr>
-          <p:cNvPr id="2" name="Title 1">
-            <a:extLst>
-              <a:ext uri="{FF2B5EF4-FFF2-40B4-BE49-F238E27FC236}">
-                <a16:creationId xmlns:a16="http://schemas.microsoft.com/office/drawing/2014/main" id="{5B931770-76C9-F749-9B7D-08A4A1F13896}"/>
-              </a:ext>
-            </a:extLst>
-          </p:cNvPr>
-          <p:cNvSpPr>
-            <a:spLocks noGrp="1"/>
-          </p:cNvSpPr>
-          <p:nvPr>
-            <p:ph type="title"/>
-          </p:nvPr>
-        </p:nvSpPr>
-        <p:spPr>
-          <a:xfrm>
-            <a:off x="0" y="228600"/>
-            <a:ext cx="9144000" cy="1143000"/>
-          </a:xfrm>
-        </p:spPr>
-        <p:txBody>
-          <a:bodyPr/>
-          <a:lstStyle/>
-          <a:p>
-            <a:r>
-              <a:rPr lang="en-US" dirty="0"/>
-              <a:t>Brewery Count by State</a:t>
-            </a:r>
-          </a:p>
-        </p:txBody>
-      </p:sp>
-      <p:sp>
-        <p:nvSpPr>
-          <p:cNvPr id="5" name="Content Placeholder 4">
-            <a:extLst>
-              <a:ext uri="{FF2B5EF4-FFF2-40B4-BE49-F238E27FC236}">
-                <a16:creationId xmlns:a16="http://schemas.microsoft.com/office/drawing/2014/main" id="{375CDB98-7F05-41AD-9F29-81E3D0CFBEFF}"/>
-              </a:ext>
-            </a:extLst>
-          </p:cNvPr>
-          <p:cNvSpPr>
-            <a:spLocks noGrp="1"/>
-          </p:cNvSpPr>
-          <p:nvPr>
-            <p:ph idx="1"/>
-          </p:nvPr>
-        </p:nvSpPr>
-        <p:spPr>
-          <a:xfrm>
-            <a:off x="457199" y="1627905"/>
-            <a:ext cx="8229600" cy="4854011"/>
-          </a:xfrm>
-        </p:spPr>
-        <p:txBody>
-          <a:bodyPr/>
-          <a:lstStyle/>
-          <a:p>
-            <a:r>
-              <a:rPr lang="en-US" dirty="0"/>
-              <a:t>How many breweries are present in each state?</a:t>
-            </a:r>
-          </a:p>
-          <a:p>
-            <a:endParaRPr lang="en-US" dirty="0"/>
-          </a:p>
-          <a:p>
-            <a:endParaRPr lang="en-US" dirty="0"/>
-          </a:p>
-          <a:p>
-            <a:endParaRPr lang="en-US" dirty="0"/>
-          </a:p>
-          <a:p>
-            <a:endParaRPr lang="en-US" dirty="0"/>
-          </a:p>
-          <a:p>
-            <a:endParaRPr lang="en-US" dirty="0"/>
-          </a:p>
-          <a:p>
-            <a:pPr marL="0" indent="0">
-              <a:buNone/>
-            </a:pPr>
-            <a:endParaRPr lang="en-US" sz="1600" i="1" dirty="0"/>
-          </a:p>
-          <a:p>
-            <a:pPr marL="0" indent="0">
-              <a:buNone/>
-            </a:pPr>
-            <a:r>
-              <a:rPr lang="en-US" sz="1600" i="1" dirty="0"/>
-              <a:t>Note that all 50 states have at least one brewery listed, including the District of Columbia (DC), for a total of 51.</a:t>
-            </a:r>
-          </a:p>
-          <a:p>
-            <a:endParaRPr lang="en-US" dirty="0"/>
-          </a:p>
-          <a:p>
-            <a:pPr marL="0" indent="0">
-              <a:buNone/>
-            </a:pPr>
-            <a:endParaRPr lang="en-US" dirty="0"/>
-          </a:p>
-        </p:txBody>
-      </p:sp>
-      <p:pic>
-        <p:nvPicPr>
-          <p:cNvPr id="3" name="Picture 2">
-            <a:extLst>
-              <a:ext uri="{FF2B5EF4-FFF2-40B4-BE49-F238E27FC236}">
-                <a16:creationId xmlns:a16="http://schemas.microsoft.com/office/drawing/2014/main" id="{17A5D552-F225-44DA-9777-952224944CDF}"/>
-              </a:ext>
-            </a:extLst>
-          </p:cNvPr>
-          <p:cNvPicPr>
-            <a:picLocks noChangeAspect="1"/>
-          </p:cNvPicPr>
-          <p:nvPr/>
-        </p:nvPicPr>
-        <p:blipFill>
-          <a:blip r:embed="rId2"/>
-          <a:stretch>
-            <a:fillRect/>
-          </a:stretch>
-        </p:blipFill>
-        <p:spPr>
-          <a:xfrm>
-            <a:off x="325701" y="2824126"/>
-            <a:ext cx="4418776" cy="2712516"/>
-          </a:xfrm>
-          <a:prstGeom prst="rect">
-            <a:avLst/>
-          </a:prstGeom>
-        </p:spPr>
-      </p:pic>
-      <p:pic>
-        <p:nvPicPr>
-          <p:cNvPr id="4" name="Picture 3">
-            <a:extLst>
-              <a:ext uri="{FF2B5EF4-FFF2-40B4-BE49-F238E27FC236}">
-                <a16:creationId xmlns:a16="http://schemas.microsoft.com/office/drawing/2014/main" id="{05E12C6C-F6AF-4A12-9246-2A612A40C3DA}"/>
-              </a:ext>
-            </a:extLst>
-          </p:cNvPr>
-          <p:cNvPicPr>
-            <a:picLocks noChangeAspect="1"/>
-          </p:cNvPicPr>
-          <p:nvPr/>
-        </p:nvPicPr>
-        <p:blipFill>
-          <a:blip r:embed="rId3"/>
-          <a:stretch>
-            <a:fillRect/>
-          </a:stretch>
-        </p:blipFill>
-        <p:spPr>
-          <a:xfrm>
-            <a:off x="4744476" y="2824127"/>
-            <a:ext cx="4254235" cy="2759956"/>
-          </a:xfrm>
-          <a:prstGeom prst="rect">
-            <a:avLst/>
-          </a:prstGeom>
-        </p:spPr>
-      </p:pic>
-    </p:spTree>
-    <p:extLst>
-      <p:ext uri="{BB962C8B-B14F-4D97-AF65-F5344CB8AC3E}">
-        <p14:creationId xmlns:p14="http://schemas.microsoft.com/office/powerpoint/2010/main" val="3016725513"/>
-      </p:ext>
-    </p:extLst>
-  </p:cSld>
-  <p:clrMapOvr>
-    <a:masterClrMapping/>
-  </p:clrMapOvr>
-</p:sld>
-</file>
-
-<file path=ppt/slides/slide18.xml><?xml version="1.0" encoding="utf-8"?>
-<p:sld xmlns:a="http://schemas.openxmlformats.org/drawingml/2006/main" xmlns:r="http://schemas.openxmlformats.org/officeDocument/2006/relationships" xmlns:p="http://schemas.openxmlformats.org/presentationml/2006/main">
-  <p:cSld>
-    <p:spTree>
-      <p:nvGrpSpPr>
-        <p:cNvPr id="1" name=""/>
-        <p:cNvGrpSpPr/>
-        <p:nvPr/>
-      </p:nvGrpSpPr>
-      <p:grpSpPr>
-        <a:xfrm>
-          <a:off x="0" y="0"/>
-          <a:ext cx="0" cy="0"/>
-          <a:chOff x="0" y="0"/>
-          <a:chExt cx="0" cy="0"/>
-        </a:xfrm>
-      </p:grpSpPr>
-      <p:sp>
-        <p:nvSpPr>
-          <p:cNvPr id="2" name="Title 1">
-            <a:extLst>
-              <a:ext uri="{FF2B5EF4-FFF2-40B4-BE49-F238E27FC236}">
-                <a16:creationId xmlns:a16="http://schemas.microsoft.com/office/drawing/2014/main" id="{5B931770-76C9-F749-9B7D-08A4A1F13896}"/>
-              </a:ext>
-            </a:extLst>
-          </p:cNvPr>
-          <p:cNvSpPr>
-            <a:spLocks noGrp="1"/>
-          </p:cNvSpPr>
-          <p:nvPr>
-            <p:ph type="title"/>
-          </p:nvPr>
-        </p:nvSpPr>
-        <p:spPr>
-          <a:xfrm>
-            <a:off x="0" y="228600"/>
-            <a:ext cx="9144000" cy="1143000"/>
-          </a:xfrm>
-        </p:spPr>
-        <p:txBody>
-          <a:bodyPr/>
-          <a:lstStyle/>
-          <a:p>
-            <a:r>
-              <a:rPr lang="en-US" dirty="0"/>
-              <a:t>Missing Values</a:t>
-            </a:r>
-          </a:p>
-        </p:txBody>
-      </p:sp>
-      <p:sp>
-        <p:nvSpPr>
-          <p:cNvPr id="8" name="Content Placeholder 4">
-            <a:extLst>
-              <a:ext uri="{FF2B5EF4-FFF2-40B4-BE49-F238E27FC236}">
-                <a16:creationId xmlns:a16="http://schemas.microsoft.com/office/drawing/2014/main" id="{4642B19D-3DF3-4F9F-B645-7D34C2B298DB}"/>
-              </a:ext>
-            </a:extLst>
-          </p:cNvPr>
-          <p:cNvSpPr txBox="1">
-            <a:spLocks/>
-          </p:cNvSpPr>
-          <p:nvPr/>
-        </p:nvSpPr>
-        <p:spPr>
-          <a:xfrm>
-            <a:off x="457200" y="1631695"/>
-            <a:ext cx="8229600" cy="1885795"/>
-          </a:xfrm>
-          <a:prstGeom prst="rect">
-            <a:avLst/>
-          </a:prstGeom>
-        </p:spPr>
-        <p:txBody>
-          <a:bodyPr vert="horz" lIns="91440" tIns="45720" rIns="91440" bIns="45720" rtlCol="0">
-            <a:noAutofit/>
-          </a:bodyPr>
-          <a:lstStyle>
-            <a:lvl1pPr marL="342900" indent="-342900" algn="l" defTabSz="914400" rtl="0" eaLnBrk="1" latinLnBrk="0" hangingPunct="1">
-              <a:spcBef>
-                <a:spcPts val="600"/>
-              </a:spcBef>
-              <a:buFont typeface="Arial" charset="0"/>
-              <a:buChar char="•"/>
-              <a:defRPr sz="3200" kern="1200">
-                <a:solidFill>
-                  <a:schemeClr val="tx1"/>
-                </a:solidFill>
-                <a:latin typeface="+mn-lt"/>
-                <a:ea typeface="+mn-ea"/>
-                <a:cs typeface="+mn-cs"/>
-              </a:defRPr>
-            </a:lvl1pPr>
-            <a:lvl2pPr marL="742950" indent="-285750" algn="l" defTabSz="914400" rtl="0" eaLnBrk="1" latinLnBrk="0" hangingPunct="1">
-              <a:spcBef>
-                <a:spcPts val="600"/>
-              </a:spcBef>
-              <a:buFont typeface="Arial" charset="0"/>
-              <a:buChar char="•"/>
-              <a:defRPr sz="2800" b="0" i="0" u="none" kern="1200">
-                <a:solidFill>
-                  <a:schemeClr val="tx1"/>
-                </a:solidFill>
-                <a:latin typeface="+mn-lt"/>
-                <a:ea typeface="+mn-ea"/>
-                <a:cs typeface="+mn-cs"/>
-              </a:defRPr>
-            </a:lvl2pPr>
-            <a:lvl3pPr marL="1143000" indent="-228600" algn="l" defTabSz="914400" rtl="0" eaLnBrk="1" latinLnBrk="0" hangingPunct="1">
-              <a:spcBef>
-                <a:spcPts val="600"/>
-              </a:spcBef>
-              <a:buFont typeface="Arial" charset="0"/>
-              <a:buChar char="•"/>
-              <a:defRPr sz="2400" kern="1200">
-                <a:solidFill>
-                  <a:schemeClr val="tx1"/>
-                </a:solidFill>
-                <a:latin typeface="+mn-lt"/>
-                <a:ea typeface="+mn-ea"/>
-                <a:cs typeface="+mn-cs"/>
-              </a:defRPr>
-            </a:lvl3pPr>
-            <a:lvl4pPr marL="1600200" indent="-228600" algn="l" defTabSz="914400" rtl="0" eaLnBrk="1" latinLnBrk="0" hangingPunct="1">
-              <a:spcBef>
-                <a:spcPts val="600"/>
-              </a:spcBef>
-              <a:buFont typeface="Arial" charset="0"/>
-              <a:buChar char="•"/>
-              <a:defRPr sz="2000" kern="1200">
-                <a:solidFill>
-                  <a:schemeClr val="tx1"/>
-                </a:solidFill>
-                <a:latin typeface="+mn-lt"/>
-                <a:ea typeface="+mn-ea"/>
-                <a:cs typeface="+mn-cs"/>
-              </a:defRPr>
-            </a:lvl4pPr>
-            <a:lvl5pPr marL="2057400" indent="-228600" algn="l" defTabSz="914400" rtl="0" eaLnBrk="1" latinLnBrk="0" hangingPunct="1">
-              <a:spcBef>
-                <a:spcPts val="600"/>
-              </a:spcBef>
-              <a:buFont typeface="Arial" charset="0"/>
-              <a:buChar char="•"/>
-              <a:defRPr sz="2000" kern="1200">
-                <a:solidFill>
-                  <a:schemeClr val="tx1"/>
-                </a:solidFill>
-                <a:latin typeface="+mn-lt"/>
-                <a:ea typeface="+mn-ea"/>
-                <a:cs typeface="+mn-cs"/>
-              </a:defRPr>
-            </a:lvl5pPr>
-            <a:lvl6pPr marL="2514600" indent="-228600" algn="l" defTabSz="914400" rtl="0" eaLnBrk="1" latinLnBrk="0" hangingPunct="1">
-              <a:spcBef>
-                <a:spcPct val="20000"/>
-              </a:spcBef>
-              <a:buFont typeface="Arial" panose="020B0604020202020204" pitchFamily="34" charset="0"/>
-              <a:buChar char="•"/>
-              <a:defRPr sz="2000" kern="1200">
-                <a:solidFill>
-                  <a:schemeClr val="tx1"/>
-                </a:solidFill>
-                <a:latin typeface="+mn-lt"/>
-                <a:ea typeface="+mn-ea"/>
-                <a:cs typeface="+mn-cs"/>
-              </a:defRPr>
-            </a:lvl6pPr>
-            <a:lvl7pPr marL="2971800" indent="-228600" algn="l" defTabSz="914400" rtl="0" eaLnBrk="1" latinLnBrk="0" hangingPunct="1">
-              <a:spcBef>
-                <a:spcPct val="20000"/>
-              </a:spcBef>
-              <a:buFont typeface="Arial" panose="020B0604020202020204" pitchFamily="34" charset="0"/>
-              <a:buChar char="•"/>
-              <a:defRPr sz="2000" kern="1200">
-                <a:solidFill>
-                  <a:schemeClr val="tx1"/>
-                </a:solidFill>
-                <a:latin typeface="+mn-lt"/>
-                <a:ea typeface="+mn-ea"/>
-                <a:cs typeface="+mn-cs"/>
-              </a:defRPr>
-            </a:lvl7pPr>
-            <a:lvl8pPr marL="3429000" indent="-228600" algn="l" defTabSz="914400" rtl="0" eaLnBrk="1" latinLnBrk="0" hangingPunct="1">
-              <a:spcBef>
-                <a:spcPct val="20000"/>
-              </a:spcBef>
-              <a:buFont typeface="Arial" panose="020B0604020202020204" pitchFamily="34" charset="0"/>
-              <a:buChar char="•"/>
-              <a:defRPr sz="2000" kern="1200">
-                <a:solidFill>
-                  <a:schemeClr val="tx1"/>
-                </a:solidFill>
-                <a:latin typeface="+mn-lt"/>
-                <a:ea typeface="+mn-ea"/>
-                <a:cs typeface="+mn-cs"/>
-              </a:defRPr>
-            </a:lvl8pPr>
-            <a:lvl9pPr marL="3886200" indent="-228600" algn="l" defTabSz="914400" rtl="0" eaLnBrk="1" latinLnBrk="0" hangingPunct="1">
-              <a:spcBef>
-                <a:spcPct val="20000"/>
-              </a:spcBef>
-              <a:buFont typeface="Arial" panose="020B0604020202020204" pitchFamily="34" charset="0"/>
-              <a:buChar char="•"/>
-              <a:defRPr sz="2000" kern="1200">
-                <a:solidFill>
-                  <a:schemeClr val="tx1"/>
-                </a:solidFill>
-                <a:latin typeface="+mn-lt"/>
-                <a:ea typeface="+mn-ea"/>
-                <a:cs typeface="+mn-cs"/>
-              </a:defRPr>
-            </a:lvl9pPr>
-          </a:lstStyle>
-          <a:p>
-            <a:r>
-              <a:rPr lang="en-US" dirty="0"/>
-              <a:t>The </a:t>
-            </a:r>
-            <a:r>
-              <a:rPr lang="en-US" b="1" dirty="0"/>
-              <a:t>ABV</a:t>
-            </a:r>
-            <a:r>
-              <a:rPr lang="en-US" dirty="0"/>
-              <a:t> (Alcohol by Volume), </a:t>
-            </a:r>
-            <a:r>
-              <a:rPr lang="en-US" b="1" dirty="0"/>
-              <a:t>IBU</a:t>
-            </a:r>
-            <a:r>
-              <a:rPr lang="en-US" dirty="0"/>
-              <a:t> (International Bitterness Unit) and </a:t>
-            </a:r>
-            <a:r>
-              <a:rPr lang="en-US" b="1" dirty="0"/>
-              <a:t>Style</a:t>
-            </a:r>
-            <a:r>
-              <a:rPr lang="en-US" dirty="0"/>
-              <a:t> columns have missing values</a:t>
-            </a:r>
-          </a:p>
-          <a:p>
-            <a:pPr marL="0" indent="0">
-              <a:buFont typeface="Arial" charset="0"/>
-              <a:buNone/>
-            </a:pPr>
-            <a:endParaRPr lang="en-US" sz="1600" i="1" dirty="0"/>
-          </a:p>
-          <a:p>
-            <a:endParaRPr lang="en-US" dirty="0"/>
-          </a:p>
-          <a:p>
-            <a:pPr marL="0" indent="0">
-              <a:buFont typeface="Arial" charset="0"/>
-              <a:buNone/>
-            </a:pPr>
-            <a:endParaRPr lang="en-US" dirty="0"/>
-          </a:p>
-        </p:txBody>
-      </p:sp>
-      <p:sp>
-        <p:nvSpPr>
-          <p:cNvPr id="9" name="Rectangle 8">
-            <a:extLst>
-              <a:ext uri="{FF2B5EF4-FFF2-40B4-BE49-F238E27FC236}">
-                <a16:creationId xmlns:a16="http://schemas.microsoft.com/office/drawing/2014/main" id="{4375ED10-2269-47BD-AE58-7E98C7139453}"/>
-              </a:ext>
-            </a:extLst>
-          </p:cNvPr>
-          <p:cNvSpPr/>
-          <p:nvPr/>
-        </p:nvSpPr>
-        <p:spPr>
-          <a:xfrm>
-            <a:off x="2192977" y="5582685"/>
-            <a:ext cx="4758045" cy="646331"/>
-          </a:xfrm>
-          <a:prstGeom prst="rect">
-            <a:avLst/>
-          </a:prstGeom>
-        </p:spPr>
-        <p:txBody>
-          <a:bodyPr wrap="square">
-            <a:spAutoFit/>
-          </a:bodyPr>
-          <a:lstStyle/>
-          <a:p>
-            <a:r>
-              <a:rPr lang="en-US" i="1" dirty="0"/>
-              <a:t>In particular, the IBU field as over 41% of the records with a blank value for this data point.</a:t>
-            </a:r>
-          </a:p>
-        </p:txBody>
-      </p:sp>
-      <p:pic>
-        <p:nvPicPr>
-          <p:cNvPr id="3" name="Picture 2">
-            <a:extLst>
-              <a:ext uri="{FF2B5EF4-FFF2-40B4-BE49-F238E27FC236}">
-                <a16:creationId xmlns:a16="http://schemas.microsoft.com/office/drawing/2014/main" id="{47359223-6B42-45E7-9BF3-ABF059A277DF}"/>
-              </a:ext>
-            </a:extLst>
-          </p:cNvPr>
-          <p:cNvPicPr>
-            <a:picLocks noChangeAspect="1"/>
-          </p:cNvPicPr>
-          <p:nvPr/>
-        </p:nvPicPr>
-        <p:blipFill>
-          <a:blip r:embed="rId2"/>
-          <a:stretch>
-            <a:fillRect/>
-          </a:stretch>
-        </p:blipFill>
-        <p:spPr>
-          <a:xfrm>
-            <a:off x="2664858" y="3357636"/>
-            <a:ext cx="3814284" cy="1868669"/>
-          </a:xfrm>
-          <a:prstGeom prst="rect">
-            <a:avLst/>
-          </a:prstGeom>
-        </p:spPr>
-      </p:pic>
-    </p:spTree>
-    <p:extLst>
-      <p:ext uri="{BB962C8B-B14F-4D97-AF65-F5344CB8AC3E}">
-        <p14:creationId xmlns:p14="http://schemas.microsoft.com/office/powerpoint/2010/main" val="2857780233"/>
-      </p:ext>
-    </p:extLst>
-  </p:cSld>
-  <p:clrMapOvr>
-    <a:masterClrMapping/>
-  </p:clrMapOvr>
-</p:sld>
-</file>
-
-<file path=ppt/slides/slide19.xml><?xml version="1.0" encoding="utf-8"?>
-<p:sld xmlns:a="http://schemas.openxmlformats.org/drawingml/2006/main" xmlns:r="http://schemas.openxmlformats.org/officeDocument/2006/relationships" xmlns:p="http://schemas.openxmlformats.org/presentationml/2006/main">
-  <p:cSld>
-    <p:spTree>
-      <p:nvGrpSpPr>
-        <p:cNvPr id="1" name=""/>
-        <p:cNvGrpSpPr/>
-        <p:nvPr/>
-      </p:nvGrpSpPr>
-      <p:grpSpPr>
-        <a:xfrm>
-          <a:off x="0" y="0"/>
-          <a:ext cx="0" cy="0"/>
-          <a:chOff x="0" y="0"/>
-          <a:chExt cx="0" cy="0"/>
-        </a:xfrm>
-      </p:grpSpPr>
-      <p:sp>
-        <p:nvSpPr>
-          <p:cNvPr id="2" name="Title 1">
-            <a:extLst>
-              <a:ext uri="{FF2B5EF4-FFF2-40B4-BE49-F238E27FC236}">
-                <a16:creationId xmlns:a16="http://schemas.microsoft.com/office/drawing/2014/main" id="{5B931770-76C9-F749-9B7D-08A4A1F13896}"/>
-              </a:ext>
-            </a:extLst>
-          </p:cNvPr>
-          <p:cNvSpPr>
-            <a:spLocks noGrp="1"/>
-          </p:cNvSpPr>
-          <p:nvPr>
-            <p:ph type="title"/>
-          </p:nvPr>
-        </p:nvSpPr>
-        <p:spPr>
-          <a:xfrm>
-            <a:off x="0" y="228600"/>
-            <a:ext cx="9144000" cy="1143000"/>
-          </a:xfrm>
-        </p:spPr>
-        <p:txBody>
-          <a:bodyPr/>
-          <a:lstStyle/>
-          <a:p>
-            <a:r>
-              <a:rPr lang="en-US" dirty="0"/>
-              <a:t>Median ABV per State</a:t>
-            </a:r>
-          </a:p>
-        </p:txBody>
-      </p:sp>
-      <p:sp>
-        <p:nvSpPr>
-          <p:cNvPr id="5" name="Content Placeholder 4">
-            <a:extLst>
-              <a:ext uri="{FF2B5EF4-FFF2-40B4-BE49-F238E27FC236}">
-                <a16:creationId xmlns:a16="http://schemas.microsoft.com/office/drawing/2014/main" id="{375CDB98-7F05-41AD-9F29-81E3D0CFBEFF}"/>
-              </a:ext>
-            </a:extLst>
-          </p:cNvPr>
-          <p:cNvSpPr>
-            <a:spLocks noGrp="1"/>
-          </p:cNvSpPr>
-          <p:nvPr>
-            <p:ph idx="1"/>
-          </p:nvPr>
-        </p:nvSpPr>
-        <p:spPr>
-          <a:xfrm>
-            <a:off x="457199" y="1627905"/>
-            <a:ext cx="8229600" cy="4854011"/>
-          </a:xfrm>
-        </p:spPr>
-        <p:txBody>
-          <a:bodyPr/>
-          <a:lstStyle/>
-          <a:p>
-            <a:endParaRPr lang="en-US" dirty="0"/>
-          </a:p>
-          <a:p>
-            <a:endParaRPr lang="en-US" dirty="0"/>
-          </a:p>
-          <a:p>
-            <a:endParaRPr lang="en-US" dirty="0"/>
-          </a:p>
-          <a:p>
-            <a:endParaRPr lang="en-US" dirty="0"/>
-          </a:p>
-          <a:p>
-            <a:endParaRPr lang="en-US" dirty="0"/>
-          </a:p>
-          <a:p>
-            <a:pPr marL="0" indent="0">
-              <a:buNone/>
-            </a:pPr>
-            <a:endParaRPr lang="en-US" sz="1600" i="1" dirty="0"/>
-          </a:p>
-          <a:p>
-            <a:pPr marL="0" indent="0">
-              <a:buNone/>
-            </a:pPr>
-            <a:endParaRPr lang="en-US" dirty="0"/>
-          </a:p>
-        </p:txBody>
-      </p:sp>
-      <p:sp>
-        <p:nvSpPr>
-          <p:cNvPr id="4" name="Rectangle 3">
-            <a:extLst>
-              <a:ext uri="{FF2B5EF4-FFF2-40B4-BE49-F238E27FC236}">
-                <a16:creationId xmlns:a16="http://schemas.microsoft.com/office/drawing/2014/main" id="{6608DBBE-C619-4CEB-9667-544ECD27A105}"/>
-              </a:ext>
-            </a:extLst>
-          </p:cNvPr>
-          <p:cNvSpPr/>
-          <p:nvPr/>
-        </p:nvSpPr>
-        <p:spPr>
-          <a:xfrm>
-            <a:off x="207115" y="5616258"/>
-            <a:ext cx="9062884" cy="923330"/>
-          </a:xfrm>
-          <a:prstGeom prst="rect">
-            <a:avLst/>
-          </a:prstGeom>
-        </p:spPr>
-        <p:txBody>
-          <a:bodyPr wrap="square">
-            <a:spAutoFit/>
-          </a:bodyPr>
-          <a:lstStyle/>
-          <a:p>
-            <a:r>
-              <a:rPr lang="en-US" i="1" dirty="0"/>
-              <a:t>From visually inspecting the graph, most states have a relatively close spread.  The summary statistics show that 50% of the available data fall within the interval </a:t>
-            </a:r>
-          </a:p>
-          <a:p>
-            <a:r>
-              <a:rPr lang="en-US" i="1" dirty="0"/>
-              <a:t>(0.05 to 0.067)</a:t>
-            </a:r>
-          </a:p>
-        </p:txBody>
-      </p:sp>
-      <p:pic>
-        <p:nvPicPr>
-          <p:cNvPr id="7" name="Picture 6" descr="A screenshot of a cell phone&#10;&#10;Description automatically generated">
-            <a:extLst>
-              <a:ext uri="{FF2B5EF4-FFF2-40B4-BE49-F238E27FC236}">
-                <a16:creationId xmlns:a16="http://schemas.microsoft.com/office/drawing/2014/main" id="{4A45DD21-7BF6-489C-9C57-8E649F4885DC}"/>
-              </a:ext>
-            </a:extLst>
-          </p:cNvPr>
-          <p:cNvPicPr>
-            <a:picLocks noChangeAspect="1"/>
-          </p:cNvPicPr>
-          <p:nvPr/>
-        </p:nvPicPr>
-        <p:blipFill>
-          <a:blip r:embed="rId2"/>
-          <a:stretch>
-            <a:fillRect/>
-          </a:stretch>
-        </p:blipFill>
-        <p:spPr>
-          <a:xfrm>
-            <a:off x="1237784" y="1436242"/>
-            <a:ext cx="6668431" cy="4115374"/>
-          </a:xfrm>
-          <a:prstGeom prst="rect">
-            <a:avLst/>
-          </a:prstGeom>
-        </p:spPr>
-      </p:pic>
-    </p:spTree>
-    <p:extLst>
-      <p:ext uri="{BB962C8B-B14F-4D97-AF65-F5344CB8AC3E}">
-        <p14:creationId xmlns:p14="http://schemas.microsoft.com/office/powerpoint/2010/main" val="3119558950"/>
+        <p14:creationId xmlns:p14="http://schemas.microsoft.com/office/powerpoint/2010/main" val="876298325"/>
       </p:ext>
     </p:extLst>
   </p:cSld>
@@ -7508,1267 +5414,6 @@
     <p:extLst>
       <p:ext uri="{BB962C8B-B14F-4D97-AF65-F5344CB8AC3E}">
         <p14:creationId xmlns:p14="http://schemas.microsoft.com/office/powerpoint/2010/main" val="973086872"/>
-      </p:ext>
-    </p:extLst>
-  </p:cSld>
-  <p:clrMapOvr>
-    <a:masterClrMapping/>
-  </p:clrMapOvr>
-</p:sld>
-</file>
-
-<file path=ppt/slides/slide20.xml><?xml version="1.0" encoding="utf-8"?>
-<p:sld xmlns:a="http://schemas.openxmlformats.org/drawingml/2006/main" xmlns:r="http://schemas.openxmlformats.org/officeDocument/2006/relationships" xmlns:p="http://schemas.openxmlformats.org/presentationml/2006/main">
-  <p:cSld>
-    <p:spTree>
-      <p:nvGrpSpPr>
-        <p:cNvPr id="1" name=""/>
-        <p:cNvGrpSpPr/>
-        <p:nvPr/>
-      </p:nvGrpSpPr>
-      <p:grpSpPr>
-        <a:xfrm>
-          <a:off x="0" y="0"/>
-          <a:ext cx="0" cy="0"/>
-          <a:chOff x="0" y="0"/>
-          <a:chExt cx="0" cy="0"/>
-        </a:xfrm>
-      </p:grpSpPr>
-      <p:sp>
-        <p:nvSpPr>
-          <p:cNvPr id="2" name="Title 1">
-            <a:extLst>
-              <a:ext uri="{FF2B5EF4-FFF2-40B4-BE49-F238E27FC236}">
-                <a16:creationId xmlns:a16="http://schemas.microsoft.com/office/drawing/2014/main" id="{5B931770-76C9-F749-9B7D-08A4A1F13896}"/>
-              </a:ext>
-            </a:extLst>
-          </p:cNvPr>
-          <p:cNvSpPr>
-            <a:spLocks noGrp="1"/>
-          </p:cNvSpPr>
-          <p:nvPr>
-            <p:ph type="title"/>
-          </p:nvPr>
-        </p:nvSpPr>
-        <p:spPr>
-          <a:xfrm>
-            <a:off x="0" y="228600"/>
-            <a:ext cx="9144000" cy="1143000"/>
-          </a:xfrm>
-        </p:spPr>
-        <p:txBody>
-          <a:bodyPr/>
-          <a:lstStyle/>
-          <a:p>
-            <a:r>
-              <a:rPr lang="en-US" dirty="0"/>
-              <a:t>Median IBU per State</a:t>
-            </a:r>
-          </a:p>
-        </p:txBody>
-      </p:sp>
-      <p:sp>
-        <p:nvSpPr>
-          <p:cNvPr id="5" name="Content Placeholder 4">
-            <a:extLst>
-              <a:ext uri="{FF2B5EF4-FFF2-40B4-BE49-F238E27FC236}">
-                <a16:creationId xmlns:a16="http://schemas.microsoft.com/office/drawing/2014/main" id="{375CDB98-7F05-41AD-9F29-81E3D0CFBEFF}"/>
-              </a:ext>
-            </a:extLst>
-          </p:cNvPr>
-          <p:cNvSpPr>
-            <a:spLocks noGrp="1"/>
-          </p:cNvSpPr>
-          <p:nvPr>
-            <p:ph idx="1"/>
-          </p:nvPr>
-        </p:nvSpPr>
-        <p:spPr>
-          <a:xfrm>
-            <a:off x="457199" y="1627905"/>
-            <a:ext cx="8229600" cy="4854011"/>
-          </a:xfrm>
-        </p:spPr>
-        <p:txBody>
-          <a:bodyPr/>
-          <a:lstStyle/>
-          <a:p>
-            <a:endParaRPr lang="en-US" dirty="0"/>
-          </a:p>
-          <a:p>
-            <a:endParaRPr lang="en-US" dirty="0"/>
-          </a:p>
-          <a:p>
-            <a:endParaRPr lang="en-US" dirty="0"/>
-          </a:p>
-          <a:p>
-            <a:endParaRPr lang="en-US" dirty="0"/>
-          </a:p>
-          <a:p>
-            <a:endParaRPr lang="en-US" dirty="0"/>
-          </a:p>
-          <a:p>
-            <a:pPr marL="0" indent="0">
-              <a:buNone/>
-            </a:pPr>
-            <a:endParaRPr lang="en-US" sz="1600" i="1" dirty="0"/>
-          </a:p>
-          <a:p>
-            <a:pPr marL="0" indent="0">
-              <a:buNone/>
-            </a:pPr>
-            <a:endParaRPr lang="en-US" dirty="0"/>
-          </a:p>
-        </p:txBody>
-      </p:sp>
-      <p:sp>
-        <p:nvSpPr>
-          <p:cNvPr id="6" name="Rectangle 5">
-            <a:extLst>
-              <a:ext uri="{FF2B5EF4-FFF2-40B4-BE49-F238E27FC236}">
-                <a16:creationId xmlns:a16="http://schemas.microsoft.com/office/drawing/2014/main" id="{F8B83E26-92F5-4B23-ACBB-69BAFA025801}"/>
-              </a:ext>
-            </a:extLst>
-          </p:cNvPr>
-          <p:cNvSpPr/>
-          <p:nvPr/>
-        </p:nvSpPr>
-        <p:spPr>
-          <a:xfrm>
-            <a:off x="207115" y="5964581"/>
-            <a:ext cx="9062884" cy="646331"/>
-          </a:xfrm>
-          <a:prstGeom prst="rect">
-            <a:avLst/>
-          </a:prstGeom>
-        </p:spPr>
-        <p:txBody>
-          <a:bodyPr wrap="square">
-            <a:spAutoFit/>
-          </a:bodyPr>
-          <a:lstStyle/>
-          <a:p>
-            <a:r>
-              <a:rPr lang="en-US" i="1" dirty="0"/>
-              <a:t>There is much more variation in the IBU data, possibly due to missing values or regional preferences.</a:t>
-            </a:r>
-          </a:p>
-        </p:txBody>
-      </p:sp>
-      <p:pic>
-        <p:nvPicPr>
-          <p:cNvPr id="7" name="Picture 6" descr="A screenshot of a cell phone&#10;&#10;Description automatically generated">
-            <a:extLst>
-              <a:ext uri="{FF2B5EF4-FFF2-40B4-BE49-F238E27FC236}">
-                <a16:creationId xmlns:a16="http://schemas.microsoft.com/office/drawing/2014/main" id="{FF85213C-4012-4ADB-A556-14903EDF1BD7}"/>
-              </a:ext>
-            </a:extLst>
-          </p:cNvPr>
-          <p:cNvPicPr>
-            <a:picLocks noChangeAspect="1"/>
-          </p:cNvPicPr>
-          <p:nvPr/>
-        </p:nvPicPr>
-        <p:blipFill>
-          <a:blip r:embed="rId2"/>
-          <a:stretch>
-            <a:fillRect/>
-          </a:stretch>
-        </p:blipFill>
-        <p:spPr>
-          <a:xfrm>
-            <a:off x="1237783" y="1610403"/>
-            <a:ext cx="6668431" cy="4115374"/>
-          </a:xfrm>
-          <a:prstGeom prst="rect">
-            <a:avLst/>
-          </a:prstGeom>
-        </p:spPr>
-      </p:pic>
-    </p:spTree>
-    <p:extLst>
-      <p:ext uri="{BB962C8B-B14F-4D97-AF65-F5344CB8AC3E}">
-        <p14:creationId xmlns:p14="http://schemas.microsoft.com/office/powerpoint/2010/main" val="2253749982"/>
-      </p:ext>
-    </p:extLst>
-  </p:cSld>
-  <p:clrMapOvr>
-    <a:masterClrMapping/>
-  </p:clrMapOvr>
-</p:sld>
-</file>
-
-<file path=ppt/slides/slide21.xml><?xml version="1.0" encoding="utf-8"?>
-<p:sld xmlns:a="http://schemas.openxmlformats.org/drawingml/2006/main" xmlns:r="http://schemas.openxmlformats.org/officeDocument/2006/relationships" xmlns:p="http://schemas.openxmlformats.org/presentationml/2006/main">
-  <p:cSld>
-    <p:spTree>
-      <p:nvGrpSpPr>
-        <p:cNvPr id="1" name=""/>
-        <p:cNvGrpSpPr/>
-        <p:nvPr/>
-      </p:nvGrpSpPr>
-      <p:grpSpPr>
-        <a:xfrm>
-          <a:off x="0" y="0"/>
-          <a:ext cx="0" cy="0"/>
-          <a:chOff x="0" y="0"/>
-          <a:chExt cx="0" cy="0"/>
-        </a:xfrm>
-      </p:grpSpPr>
-      <p:sp>
-        <p:nvSpPr>
-          <p:cNvPr id="2" name="Title 1">
-            <a:extLst>
-              <a:ext uri="{FF2B5EF4-FFF2-40B4-BE49-F238E27FC236}">
-                <a16:creationId xmlns:a16="http://schemas.microsoft.com/office/drawing/2014/main" id="{5B931770-76C9-F749-9B7D-08A4A1F13896}"/>
-              </a:ext>
-            </a:extLst>
-          </p:cNvPr>
-          <p:cNvSpPr>
-            <a:spLocks noGrp="1"/>
-          </p:cNvSpPr>
-          <p:nvPr>
-            <p:ph type="title"/>
-          </p:nvPr>
-        </p:nvSpPr>
-        <p:spPr>
-          <a:xfrm>
-            <a:off x="0" y="228600"/>
-            <a:ext cx="9144000" cy="1143000"/>
-          </a:xfrm>
-        </p:spPr>
-        <p:txBody>
-          <a:bodyPr/>
-          <a:lstStyle/>
-          <a:p>
-            <a:r>
-              <a:rPr lang="en-US" dirty="0"/>
-              <a:t>Maximum Values by State (ABV)</a:t>
-            </a:r>
-          </a:p>
-        </p:txBody>
-      </p:sp>
-      <p:sp>
-        <p:nvSpPr>
-          <p:cNvPr id="5" name="Content Placeholder 4">
-            <a:extLst>
-              <a:ext uri="{FF2B5EF4-FFF2-40B4-BE49-F238E27FC236}">
-                <a16:creationId xmlns:a16="http://schemas.microsoft.com/office/drawing/2014/main" id="{375CDB98-7F05-41AD-9F29-81E3D0CFBEFF}"/>
-              </a:ext>
-            </a:extLst>
-          </p:cNvPr>
-          <p:cNvSpPr>
-            <a:spLocks noGrp="1"/>
-          </p:cNvSpPr>
-          <p:nvPr>
-            <p:ph idx="1"/>
-          </p:nvPr>
-        </p:nvSpPr>
-        <p:spPr>
-          <a:xfrm>
-            <a:off x="457199" y="1627905"/>
-            <a:ext cx="8229600" cy="4854011"/>
-          </a:xfrm>
-        </p:spPr>
-        <p:txBody>
-          <a:bodyPr/>
-          <a:lstStyle/>
-          <a:p>
-            <a:r>
-              <a:rPr lang="en-US" dirty="0"/>
-              <a:t>There are different measures of center, etc.. that might be useful in determining state trends.</a:t>
-            </a:r>
-          </a:p>
-          <a:p>
-            <a:pPr marL="0" indent="0">
-              <a:buNone/>
-            </a:pPr>
-            <a:endParaRPr lang="en-US" dirty="0"/>
-          </a:p>
-          <a:p>
-            <a:endParaRPr lang="en-US" dirty="0"/>
-          </a:p>
-          <a:p>
-            <a:endParaRPr lang="en-US" dirty="0"/>
-          </a:p>
-          <a:p>
-            <a:endParaRPr lang="en-US" dirty="0"/>
-          </a:p>
-          <a:p>
-            <a:endParaRPr lang="en-US" dirty="0"/>
-          </a:p>
-          <a:p>
-            <a:endParaRPr lang="en-US" dirty="0"/>
-          </a:p>
-          <a:p>
-            <a:pPr marL="0" indent="0">
-              <a:buNone/>
-            </a:pPr>
-            <a:endParaRPr lang="en-US" sz="1600" i="1" dirty="0"/>
-          </a:p>
-          <a:p>
-            <a:pPr marL="0" indent="0">
-              <a:buNone/>
-            </a:pPr>
-            <a:endParaRPr lang="en-US" dirty="0"/>
-          </a:p>
-          <a:p>
-            <a:pPr marL="0" indent="0">
-              <a:buNone/>
-            </a:pPr>
-            <a:endParaRPr lang="en-US" dirty="0"/>
-          </a:p>
-        </p:txBody>
-      </p:sp>
-      <p:sp>
-        <p:nvSpPr>
-          <p:cNvPr id="7" name="Rectangle 6">
-            <a:extLst>
-              <a:ext uri="{FF2B5EF4-FFF2-40B4-BE49-F238E27FC236}">
-                <a16:creationId xmlns:a16="http://schemas.microsoft.com/office/drawing/2014/main" id="{5958EAC4-08F2-4945-9F0D-E088897A9830}"/>
-              </a:ext>
-            </a:extLst>
-          </p:cNvPr>
-          <p:cNvSpPr/>
-          <p:nvPr/>
-        </p:nvSpPr>
-        <p:spPr>
-          <a:xfrm>
-            <a:off x="1748897" y="5738648"/>
-            <a:ext cx="5810866" cy="369332"/>
-          </a:xfrm>
-          <a:prstGeom prst="rect">
-            <a:avLst/>
-          </a:prstGeom>
-        </p:spPr>
-        <p:txBody>
-          <a:bodyPr wrap="square">
-            <a:spAutoFit/>
-          </a:bodyPr>
-          <a:lstStyle/>
-          <a:p>
-            <a:r>
-              <a:rPr lang="en-US" i="1" dirty="0"/>
-              <a:t>Depending on the statistic of interest, the answer varies</a:t>
-            </a:r>
-          </a:p>
-        </p:txBody>
-      </p:sp>
-      <p:pic>
-        <p:nvPicPr>
-          <p:cNvPr id="3" name="Picture 2">
-            <a:extLst>
-              <a:ext uri="{FF2B5EF4-FFF2-40B4-BE49-F238E27FC236}">
-                <a16:creationId xmlns:a16="http://schemas.microsoft.com/office/drawing/2014/main" id="{1AA8CDB8-E6C7-4E6D-A319-4015B9B92A22}"/>
-              </a:ext>
-            </a:extLst>
-          </p:cNvPr>
-          <p:cNvPicPr>
-            <a:picLocks noChangeAspect="1"/>
-          </p:cNvPicPr>
-          <p:nvPr/>
-        </p:nvPicPr>
-        <p:blipFill>
-          <a:blip r:embed="rId3"/>
-          <a:stretch>
-            <a:fillRect/>
-          </a:stretch>
-        </p:blipFill>
-        <p:spPr>
-          <a:xfrm>
-            <a:off x="2197561" y="3326014"/>
-            <a:ext cx="4748875" cy="2340995"/>
-          </a:xfrm>
-          <a:prstGeom prst="rect">
-            <a:avLst/>
-          </a:prstGeom>
-        </p:spPr>
-      </p:pic>
-    </p:spTree>
-    <p:extLst>
-      <p:ext uri="{BB962C8B-B14F-4D97-AF65-F5344CB8AC3E}">
-        <p14:creationId xmlns:p14="http://schemas.microsoft.com/office/powerpoint/2010/main" val="622800655"/>
-      </p:ext>
-    </p:extLst>
-  </p:cSld>
-  <p:clrMapOvr>
-    <a:masterClrMapping/>
-  </p:clrMapOvr>
-</p:sld>
-</file>
-
-<file path=ppt/slides/slide22.xml><?xml version="1.0" encoding="utf-8"?>
-<p:sld xmlns:a="http://schemas.openxmlformats.org/drawingml/2006/main" xmlns:r="http://schemas.openxmlformats.org/officeDocument/2006/relationships" xmlns:p="http://schemas.openxmlformats.org/presentationml/2006/main">
-  <p:cSld>
-    <p:spTree>
-      <p:nvGrpSpPr>
-        <p:cNvPr id="1" name=""/>
-        <p:cNvGrpSpPr/>
-        <p:nvPr/>
-      </p:nvGrpSpPr>
-      <p:grpSpPr>
-        <a:xfrm>
-          <a:off x="0" y="0"/>
-          <a:ext cx="0" cy="0"/>
-          <a:chOff x="0" y="0"/>
-          <a:chExt cx="0" cy="0"/>
-        </a:xfrm>
-      </p:grpSpPr>
-      <p:sp>
-        <p:nvSpPr>
-          <p:cNvPr id="2" name="Title 1">
-            <a:extLst>
-              <a:ext uri="{FF2B5EF4-FFF2-40B4-BE49-F238E27FC236}">
-                <a16:creationId xmlns:a16="http://schemas.microsoft.com/office/drawing/2014/main" id="{5B931770-76C9-F749-9B7D-08A4A1F13896}"/>
-              </a:ext>
-            </a:extLst>
-          </p:cNvPr>
-          <p:cNvSpPr>
-            <a:spLocks noGrp="1"/>
-          </p:cNvSpPr>
-          <p:nvPr>
-            <p:ph type="title"/>
-          </p:nvPr>
-        </p:nvSpPr>
-        <p:spPr>
-          <a:xfrm>
-            <a:off x="0" y="228600"/>
-            <a:ext cx="9144000" cy="1143000"/>
-          </a:xfrm>
-        </p:spPr>
-        <p:txBody>
-          <a:bodyPr/>
-          <a:lstStyle/>
-          <a:p>
-            <a:r>
-              <a:rPr lang="en-US" dirty="0"/>
-              <a:t>ABV and IBU Comparisons</a:t>
-            </a:r>
-          </a:p>
-        </p:txBody>
-      </p:sp>
-      <p:sp>
-        <p:nvSpPr>
-          <p:cNvPr id="5" name="Content Placeholder 4">
-            <a:extLst>
-              <a:ext uri="{FF2B5EF4-FFF2-40B4-BE49-F238E27FC236}">
-                <a16:creationId xmlns:a16="http://schemas.microsoft.com/office/drawing/2014/main" id="{375CDB98-7F05-41AD-9F29-81E3D0CFBEFF}"/>
-              </a:ext>
-            </a:extLst>
-          </p:cNvPr>
-          <p:cNvSpPr>
-            <a:spLocks noGrp="1"/>
-          </p:cNvSpPr>
-          <p:nvPr>
-            <p:ph idx="1"/>
-          </p:nvPr>
-        </p:nvSpPr>
-        <p:spPr>
-          <a:xfrm>
-            <a:off x="457199" y="1627905"/>
-            <a:ext cx="8229600" cy="4854011"/>
-          </a:xfrm>
-        </p:spPr>
-        <p:txBody>
-          <a:bodyPr/>
-          <a:lstStyle/>
-          <a:p>
-            <a:r>
-              <a:rPr lang="en-US" dirty="0"/>
-              <a:t>The ABU and IBV data show similarities in spread/ variance</a:t>
-            </a:r>
-          </a:p>
-          <a:p>
-            <a:endParaRPr lang="en-US" dirty="0"/>
-          </a:p>
-          <a:p>
-            <a:endParaRPr lang="en-US" dirty="0"/>
-          </a:p>
-          <a:p>
-            <a:endParaRPr lang="en-US" dirty="0"/>
-          </a:p>
-          <a:p>
-            <a:endParaRPr lang="en-US" dirty="0"/>
-          </a:p>
-          <a:p>
-            <a:endParaRPr lang="en-US" dirty="0"/>
-          </a:p>
-          <a:p>
-            <a:pPr marL="0" indent="0">
-              <a:buNone/>
-            </a:pPr>
-            <a:endParaRPr lang="en-US" sz="1600" i="1" dirty="0"/>
-          </a:p>
-          <a:p>
-            <a:endParaRPr lang="en-US" dirty="0"/>
-          </a:p>
-          <a:p>
-            <a:pPr marL="0" indent="0">
-              <a:buNone/>
-            </a:pPr>
-            <a:endParaRPr lang="en-US" dirty="0"/>
-          </a:p>
-        </p:txBody>
-      </p:sp>
-      <p:pic>
-        <p:nvPicPr>
-          <p:cNvPr id="6" name="Picture 5">
-            <a:extLst>
-              <a:ext uri="{FF2B5EF4-FFF2-40B4-BE49-F238E27FC236}">
-                <a16:creationId xmlns:a16="http://schemas.microsoft.com/office/drawing/2014/main" id="{60AAC40B-54E0-4C58-A5D8-E029F4AC17D3}"/>
-              </a:ext>
-            </a:extLst>
-          </p:cNvPr>
-          <p:cNvPicPr>
-            <a:picLocks noChangeAspect="1"/>
-          </p:cNvPicPr>
-          <p:nvPr/>
-        </p:nvPicPr>
-        <p:blipFill>
-          <a:blip r:embed="rId3"/>
-          <a:stretch>
-            <a:fillRect/>
-          </a:stretch>
-        </p:blipFill>
-        <p:spPr>
-          <a:xfrm>
-            <a:off x="146236" y="2860127"/>
-            <a:ext cx="4197868" cy="3517524"/>
-          </a:xfrm>
-          <a:prstGeom prst="rect">
-            <a:avLst/>
-          </a:prstGeom>
-        </p:spPr>
-      </p:pic>
-      <p:pic>
-        <p:nvPicPr>
-          <p:cNvPr id="7" name="Picture 6">
-            <a:extLst>
-              <a:ext uri="{FF2B5EF4-FFF2-40B4-BE49-F238E27FC236}">
-                <a16:creationId xmlns:a16="http://schemas.microsoft.com/office/drawing/2014/main" id="{37A11D5E-512A-49AC-A7C8-282913FA3E42}"/>
-              </a:ext>
-            </a:extLst>
-          </p:cNvPr>
-          <p:cNvPicPr>
-            <a:picLocks noChangeAspect="1"/>
-          </p:cNvPicPr>
-          <p:nvPr/>
-        </p:nvPicPr>
-        <p:blipFill>
-          <a:blip r:embed="rId4"/>
-          <a:stretch>
-            <a:fillRect/>
-          </a:stretch>
-        </p:blipFill>
-        <p:spPr>
-          <a:xfrm>
-            <a:off x="4655067" y="2860127"/>
-            <a:ext cx="4187529" cy="3517524"/>
-          </a:xfrm>
-          <a:prstGeom prst="rect">
-            <a:avLst/>
-          </a:prstGeom>
-        </p:spPr>
-      </p:pic>
-    </p:spTree>
-    <p:extLst>
-      <p:ext uri="{BB962C8B-B14F-4D97-AF65-F5344CB8AC3E}">
-        <p14:creationId xmlns:p14="http://schemas.microsoft.com/office/powerpoint/2010/main" val="147759718"/>
-      </p:ext>
-    </p:extLst>
-  </p:cSld>
-  <p:clrMapOvr>
-    <a:masterClrMapping/>
-  </p:clrMapOvr>
-</p:sld>
-</file>
-
-<file path=ppt/slides/slide23.xml><?xml version="1.0" encoding="utf-8"?>
-<p:sld xmlns:a="http://schemas.openxmlformats.org/drawingml/2006/main" xmlns:r="http://schemas.openxmlformats.org/officeDocument/2006/relationships" xmlns:p="http://schemas.openxmlformats.org/presentationml/2006/main">
-  <p:cSld>
-    <p:spTree>
-      <p:nvGrpSpPr>
-        <p:cNvPr id="1" name=""/>
-        <p:cNvGrpSpPr/>
-        <p:nvPr/>
-      </p:nvGrpSpPr>
-      <p:grpSpPr>
-        <a:xfrm>
-          <a:off x="0" y="0"/>
-          <a:ext cx="0" cy="0"/>
-          <a:chOff x="0" y="0"/>
-          <a:chExt cx="0" cy="0"/>
-        </a:xfrm>
-      </p:grpSpPr>
-      <p:sp>
-        <p:nvSpPr>
-          <p:cNvPr id="2" name="Title 1">
-            <a:extLst>
-              <a:ext uri="{FF2B5EF4-FFF2-40B4-BE49-F238E27FC236}">
-                <a16:creationId xmlns:a16="http://schemas.microsoft.com/office/drawing/2014/main" id="{5B931770-76C9-F749-9B7D-08A4A1F13896}"/>
-              </a:ext>
-            </a:extLst>
-          </p:cNvPr>
-          <p:cNvSpPr>
-            <a:spLocks noGrp="1"/>
-          </p:cNvSpPr>
-          <p:nvPr>
-            <p:ph type="title"/>
-          </p:nvPr>
-        </p:nvSpPr>
-        <p:spPr>
-          <a:xfrm>
-            <a:off x="0" y="228600"/>
-            <a:ext cx="9144000" cy="1143000"/>
-          </a:xfrm>
-        </p:spPr>
-        <p:txBody>
-          <a:bodyPr/>
-          <a:lstStyle/>
-          <a:p>
-            <a:r>
-              <a:rPr lang="en-US" dirty="0"/>
-              <a:t>Beer Style Predictions</a:t>
-            </a:r>
-          </a:p>
-        </p:txBody>
-      </p:sp>
-      <p:sp>
-        <p:nvSpPr>
-          <p:cNvPr id="5" name="Content Placeholder 4">
-            <a:extLst>
-              <a:ext uri="{FF2B5EF4-FFF2-40B4-BE49-F238E27FC236}">
-                <a16:creationId xmlns:a16="http://schemas.microsoft.com/office/drawing/2014/main" id="{375CDB98-7F05-41AD-9F29-81E3D0CFBEFF}"/>
-              </a:ext>
-            </a:extLst>
-          </p:cNvPr>
-          <p:cNvSpPr>
-            <a:spLocks noGrp="1"/>
-          </p:cNvSpPr>
-          <p:nvPr>
-            <p:ph idx="1"/>
-          </p:nvPr>
-        </p:nvSpPr>
-        <p:spPr>
-          <a:xfrm>
-            <a:off x="243347" y="1555954"/>
-            <a:ext cx="8155857" cy="5014451"/>
-          </a:xfrm>
-        </p:spPr>
-        <p:txBody>
-          <a:bodyPr/>
-          <a:lstStyle/>
-          <a:p>
-            <a:r>
-              <a:rPr lang="en-US" sz="2800" dirty="0"/>
-              <a:t>ABV and IBU served as good predictors of a beer’s style</a:t>
-            </a:r>
-          </a:p>
-          <a:p>
-            <a:pPr marL="0" indent="0">
-              <a:buNone/>
-            </a:pPr>
-            <a:endParaRPr lang="en-US" dirty="0"/>
-          </a:p>
-          <a:p>
-            <a:endParaRPr lang="en-US" dirty="0"/>
-          </a:p>
-          <a:p>
-            <a:endParaRPr lang="en-US" dirty="0"/>
-          </a:p>
-          <a:p>
-            <a:endParaRPr lang="en-US" dirty="0"/>
-          </a:p>
-          <a:p>
-            <a:endParaRPr lang="en-US" dirty="0"/>
-          </a:p>
-          <a:p>
-            <a:endParaRPr lang="en-US" dirty="0"/>
-          </a:p>
-          <a:p>
-            <a:pPr marL="0" indent="0">
-              <a:buNone/>
-            </a:pPr>
-            <a:endParaRPr lang="en-US" sz="1600" i="1" dirty="0"/>
-          </a:p>
-          <a:p>
-            <a:pPr marL="0" indent="0">
-              <a:buNone/>
-            </a:pPr>
-            <a:endParaRPr lang="en-US" dirty="0"/>
-          </a:p>
-          <a:p>
-            <a:pPr marL="0" indent="0">
-              <a:buNone/>
-            </a:pPr>
-            <a:endParaRPr lang="en-US" dirty="0"/>
-          </a:p>
-        </p:txBody>
-      </p:sp>
-      <p:pic>
-        <p:nvPicPr>
-          <p:cNvPr id="3" name="Picture 2">
-            <a:extLst>
-              <a:ext uri="{FF2B5EF4-FFF2-40B4-BE49-F238E27FC236}">
-                <a16:creationId xmlns:a16="http://schemas.microsoft.com/office/drawing/2014/main" id="{077B3C9D-2A2B-443B-B3CC-FA13AE7F280E}"/>
-              </a:ext>
-            </a:extLst>
-          </p:cNvPr>
-          <p:cNvPicPr>
-            <a:picLocks noChangeAspect="1"/>
-          </p:cNvPicPr>
-          <p:nvPr/>
-        </p:nvPicPr>
-        <p:blipFill>
-          <a:blip r:embed="rId3"/>
-          <a:stretch>
-            <a:fillRect/>
-          </a:stretch>
-        </p:blipFill>
-        <p:spPr>
-          <a:xfrm>
-            <a:off x="5604070" y="2708056"/>
-            <a:ext cx="2493356" cy="3666700"/>
-          </a:xfrm>
-          <a:prstGeom prst="rect">
-            <a:avLst/>
-          </a:prstGeom>
-        </p:spPr>
-      </p:pic>
-      <p:pic>
-        <p:nvPicPr>
-          <p:cNvPr id="7" name="Picture 6">
-            <a:extLst>
-              <a:ext uri="{FF2B5EF4-FFF2-40B4-BE49-F238E27FC236}">
-                <a16:creationId xmlns:a16="http://schemas.microsoft.com/office/drawing/2014/main" id="{62552021-6B49-4D83-AD44-4791A7C5502D}"/>
-              </a:ext>
-            </a:extLst>
-          </p:cNvPr>
-          <p:cNvPicPr>
-            <a:picLocks noChangeAspect="1"/>
-          </p:cNvPicPr>
-          <p:nvPr/>
-        </p:nvPicPr>
-        <p:blipFill>
-          <a:blip r:embed="rId4"/>
-          <a:stretch>
-            <a:fillRect/>
-          </a:stretch>
-        </p:blipFill>
-        <p:spPr>
-          <a:xfrm>
-            <a:off x="243347" y="2708056"/>
-            <a:ext cx="5058945" cy="3565421"/>
-          </a:xfrm>
-          <a:prstGeom prst="rect">
-            <a:avLst/>
-          </a:prstGeom>
-        </p:spPr>
-      </p:pic>
-    </p:spTree>
-    <p:extLst>
-      <p:ext uri="{BB962C8B-B14F-4D97-AF65-F5344CB8AC3E}">
-        <p14:creationId xmlns:p14="http://schemas.microsoft.com/office/powerpoint/2010/main" val="1044861800"/>
-      </p:ext>
-    </p:extLst>
-  </p:cSld>
-  <p:clrMapOvr>
-    <a:masterClrMapping/>
-  </p:clrMapOvr>
-</p:sld>
-</file>
-
-<file path=ppt/slides/slide24.xml><?xml version="1.0" encoding="utf-8"?>
-<p:sld xmlns:a="http://schemas.openxmlformats.org/drawingml/2006/main" xmlns:r="http://schemas.openxmlformats.org/officeDocument/2006/relationships" xmlns:p="http://schemas.openxmlformats.org/presentationml/2006/main">
-  <p:cSld>
-    <p:spTree>
-      <p:nvGrpSpPr>
-        <p:cNvPr id="1" name=""/>
-        <p:cNvGrpSpPr/>
-        <p:nvPr/>
-      </p:nvGrpSpPr>
-      <p:grpSpPr>
-        <a:xfrm>
-          <a:off x="0" y="0"/>
-          <a:ext cx="0" cy="0"/>
-          <a:chOff x="0" y="0"/>
-          <a:chExt cx="0" cy="0"/>
-        </a:xfrm>
-      </p:grpSpPr>
-      <p:sp>
-        <p:nvSpPr>
-          <p:cNvPr id="2" name="Title 1">
-            <a:extLst>
-              <a:ext uri="{FF2B5EF4-FFF2-40B4-BE49-F238E27FC236}">
-                <a16:creationId xmlns:a16="http://schemas.microsoft.com/office/drawing/2014/main" id="{5B931770-76C9-F749-9B7D-08A4A1F13896}"/>
-              </a:ext>
-            </a:extLst>
-          </p:cNvPr>
-          <p:cNvSpPr>
-            <a:spLocks noGrp="1"/>
-          </p:cNvSpPr>
-          <p:nvPr>
-            <p:ph type="title"/>
-          </p:nvPr>
-        </p:nvSpPr>
-        <p:spPr>
-          <a:xfrm>
-            <a:off x="0" y="228600"/>
-            <a:ext cx="9144000" cy="1143000"/>
-          </a:xfrm>
-        </p:spPr>
-        <p:txBody>
-          <a:bodyPr/>
-          <a:lstStyle/>
-          <a:p>
-            <a:r>
-              <a:rPr lang="en-US" dirty="0"/>
-              <a:t>Regional Comparisons</a:t>
-            </a:r>
-          </a:p>
-        </p:txBody>
-      </p:sp>
-      <p:sp>
-        <p:nvSpPr>
-          <p:cNvPr id="5" name="Content Placeholder 4">
-            <a:extLst>
-              <a:ext uri="{FF2B5EF4-FFF2-40B4-BE49-F238E27FC236}">
-                <a16:creationId xmlns:a16="http://schemas.microsoft.com/office/drawing/2014/main" id="{375CDB98-7F05-41AD-9F29-81E3D0CFBEFF}"/>
-              </a:ext>
-            </a:extLst>
-          </p:cNvPr>
-          <p:cNvSpPr>
-            <a:spLocks noGrp="1"/>
-          </p:cNvSpPr>
-          <p:nvPr>
-            <p:ph idx="1"/>
-          </p:nvPr>
-        </p:nvSpPr>
-        <p:spPr>
-          <a:xfrm>
-            <a:off x="457199" y="1627905"/>
-            <a:ext cx="8229600" cy="4854011"/>
-          </a:xfrm>
-        </p:spPr>
-        <p:txBody>
-          <a:bodyPr/>
-          <a:lstStyle/>
-          <a:p>
-            <a:r>
-              <a:rPr lang="en-US" dirty="0"/>
-              <a:t>Many of these states happen to be in regions with lower craft beer counts</a:t>
-            </a:r>
-          </a:p>
-          <a:p>
-            <a:endParaRPr lang="en-US" dirty="0"/>
-          </a:p>
-          <a:p>
-            <a:endParaRPr lang="en-US" dirty="0"/>
-          </a:p>
-          <a:p>
-            <a:endParaRPr lang="en-US" dirty="0"/>
-          </a:p>
-          <a:p>
-            <a:endParaRPr lang="en-US" dirty="0"/>
-          </a:p>
-          <a:p>
-            <a:endParaRPr lang="en-US" dirty="0"/>
-          </a:p>
-          <a:p>
-            <a:pPr marL="0" indent="0">
-              <a:buNone/>
-            </a:pPr>
-            <a:endParaRPr lang="en-US" sz="1600" i="1" dirty="0"/>
-          </a:p>
-          <a:p>
-            <a:endParaRPr lang="en-US" dirty="0"/>
-          </a:p>
-          <a:p>
-            <a:pPr marL="0" indent="0">
-              <a:buNone/>
-            </a:pPr>
-            <a:endParaRPr lang="en-US" dirty="0"/>
-          </a:p>
-        </p:txBody>
-      </p:sp>
-      <p:pic>
-        <p:nvPicPr>
-          <p:cNvPr id="3" name="Picture 2">
-            <a:extLst>
-              <a:ext uri="{FF2B5EF4-FFF2-40B4-BE49-F238E27FC236}">
-                <a16:creationId xmlns:a16="http://schemas.microsoft.com/office/drawing/2014/main" id="{7904B170-5731-499C-9F4D-1A7AEFB35961}"/>
-              </a:ext>
-            </a:extLst>
-          </p:cNvPr>
-          <p:cNvPicPr>
-            <a:picLocks noChangeAspect="1"/>
-          </p:cNvPicPr>
-          <p:nvPr/>
-        </p:nvPicPr>
-        <p:blipFill>
-          <a:blip r:embed="rId3"/>
-          <a:stretch>
-            <a:fillRect/>
-          </a:stretch>
-        </p:blipFill>
-        <p:spPr>
-          <a:xfrm>
-            <a:off x="1584791" y="2942957"/>
-            <a:ext cx="5776708" cy="3538959"/>
-          </a:xfrm>
-          <a:prstGeom prst="rect">
-            <a:avLst/>
-          </a:prstGeom>
-        </p:spPr>
-      </p:pic>
-    </p:spTree>
-    <p:extLst>
-      <p:ext uri="{BB962C8B-B14F-4D97-AF65-F5344CB8AC3E}">
-        <p14:creationId xmlns:p14="http://schemas.microsoft.com/office/powerpoint/2010/main" val="1683861339"/>
-      </p:ext>
-    </p:extLst>
-  </p:cSld>
-  <p:clrMapOvr>
-    <a:masterClrMapping/>
-  </p:clrMapOvr>
-</p:sld>
-</file>
-
-<file path=ppt/slides/slide25.xml><?xml version="1.0" encoding="utf-8"?>
-<p:sld xmlns:a="http://schemas.openxmlformats.org/drawingml/2006/main" xmlns:r="http://schemas.openxmlformats.org/officeDocument/2006/relationships" xmlns:p="http://schemas.openxmlformats.org/presentationml/2006/main">
-  <p:cSld>
-    <p:spTree>
-      <p:nvGrpSpPr>
-        <p:cNvPr id="1" name=""/>
-        <p:cNvGrpSpPr/>
-        <p:nvPr/>
-      </p:nvGrpSpPr>
-      <p:grpSpPr>
-        <a:xfrm>
-          <a:off x="0" y="0"/>
-          <a:ext cx="0" cy="0"/>
-          <a:chOff x="0" y="0"/>
-          <a:chExt cx="0" cy="0"/>
-        </a:xfrm>
-      </p:grpSpPr>
-      <p:sp>
-        <p:nvSpPr>
-          <p:cNvPr id="2" name="Title 1">
-            <a:extLst>
-              <a:ext uri="{FF2B5EF4-FFF2-40B4-BE49-F238E27FC236}">
-                <a16:creationId xmlns:a16="http://schemas.microsoft.com/office/drawing/2014/main" id="{5B931770-76C9-F749-9B7D-08A4A1F13896}"/>
-              </a:ext>
-            </a:extLst>
-          </p:cNvPr>
-          <p:cNvSpPr>
-            <a:spLocks noGrp="1"/>
-          </p:cNvSpPr>
-          <p:nvPr>
-            <p:ph type="title"/>
-          </p:nvPr>
-        </p:nvSpPr>
-        <p:spPr>
-          <a:xfrm>
-            <a:off x="0" y="228600"/>
-            <a:ext cx="9144000" cy="1143000"/>
-          </a:xfrm>
-        </p:spPr>
-        <p:txBody>
-          <a:bodyPr/>
-          <a:lstStyle/>
-          <a:p>
-            <a:r>
-              <a:rPr lang="en-US" dirty="0"/>
-              <a:t>Conclusion</a:t>
-            </a:r>
-          </a:p>
-        </p:txBody>
-      </p:sp>
-      <p:sp>
-        <p:nvSpPr>
-          <p:cNvPr id="8" name="Content Placeholder 4">
-            <a:extLst>
-              <a:ext uri="{FF2B5EF4-FFF2-40B4-BE49-F238E27FC236}">
-                <a16:creationId xmlns:a16="http://schemas.microsoft.com/office/drawing/2014/main" id="{4642B19D-3DF3-4F9F-B645-7D34C2B298DB}"/>
-              </a:ext>
-            </a:extLst>
-          </p:cNvPr>
-          <p:cNvSpPr txBox="1">
-            <a:spLocks/>
-          </p:cNvSpPr>
-          <p:nvPr/>
-        </p:nvSpPr>
-        <p:spPr>
-          <a:xfrm>
-            <a:off x="457200" y="1631695"/>
-            <a:ext cx="8229600" cy="1885795"/>
-          </a:xfrm>
-          <a:prstGeom prst="rect">
-            <a:avLst/>
-          </a:prstGeom>
-        </p:spPr>
-        <p:txBody>
-          <a:bodyPr vert="horz" lIns="91440" tIns="45720" rIns="91440" bIns="45720" rtlCol="0">
-            <a:noAutofit/>
-          </a:bodyPr>
-          <a:lstStyle>
-            <a:lvl1pPr marL="342900" indent="-342900" algn="l" defTabSz="914400" rtl="0" eaLnBrk="1" latinLnBrk="0" hangingPunct="1">
-              <a:spcBef>
-                <a:spcPts val="600"/>
-              </a:spcBef>
-              <a:buFont typeface="Arial" charset="0"/>
-              <a:buChar char="•"/>
-              <a:defRPr sz="3200" kern="1200">
-                <a:solidFill>
-                  <a:schemeClr val="tx1"/>
-                </a:solidFill>
-                <a:latin typeface="+mn-lt"/>
-                <a:ea typeface="+mn-ea"/>
-                <a:cs typeface="+mn-cs"/>
-              </a:defRPr>
-            </a:lvl1pPr>
-            <a:lvl2pPr marL="742950" indent="-285750" algn="l" defTabSz="914400" rtl="0" eaLnBrk="1" latinLnBrk="0" hangingPunct="1">
-              <a:spcBef>
-                <a:spcPts val="600"/>
-              </a:spcBef>
-              <a:buFont typeface="Arial" charset="0"/>
-              <a:buChar char="•"/>
-              <a:defRPr sz="2800" b="0" i="0" u="none" kern="1200">
-                <a:solidFill>
-                  <a:schemeClr val="tx1"/>
-                </a:solidFill>
-                <a:latin typeface="+mn-lt"/>
-                <a:ea typeface="+mn-ea"/>
-                <a:cs typeface="+mn-cs"/>
-              </a:defRPr>
-            </a:lvl2pPr>
-            <a:lvl3pPr marL="1143000" indent="-228600" algn="l" defTabSz="914400" rtl="0" eaLnBrk="1" latinLnBrk="0" hangingPunct="1">
-              <a:spcBef>
-                <a:spcPts val="600"/>
-              </a:spcBef>
-              <a:buFont typeface="Arial" charset="0"/>
-              <a:buChar char="•"/>
-              <a:defRPr sz="2400" kern="1200">
-                <a:solidFill>
-                  <a:schemeClr val="tx1"/>
-                </a:solidFill>
-                <a:latin typeface="+mn-lt"/>
-                <a:ea typeface="+mn-ea"/>
-                <a:cs typeface="+mn-cs"/>
-              </a:defRPr>
-            </a:lvl3pPr>
-            <a:lvl4pPr marL="1600200" indent="-228600" algn="l" defTabSz="914400" rtl="0" eaLnBrk="1" latinLnBrk="0" hangingPunct="1">
-              <a:spcBef>
-                <a:spcPts val="600"/>
-              </a:spcBef>
-              <a:buFont typeface="Arial" charset="0"/>
-              <a:buChar char="•"/>
-              <a:defRPr sz="2000" kern="1200">
-                <a:solidFill>
-                  <a:schemeClr val="tx1"/>
-                </a:solidFill>
-                <a:latin typeface="+mn-lt"/>
-                <a:ea typeface="+mn-ea"/>
-                <a:cs typeface="+mn-cs"/>
-              </a:defRPr>
-            </a:lvl4pPr>
-            <a:lvl5pPr marL="2057400" indent="-228600" algn="l" defTabSz="914400" rtl="0" eaLnBrk="1" latinLnBrk="0" hangingPunct="1">
-              <a:spcBef>
-                <a:spcPts val="600"/>
-              </a:spcBef>
-              <a:buFont typeface="Arial" charset="0"/>
-              <a:buChar char="•"/>
-              <a:defRPr sz="2000" kern="1200">
-                <a:solidFill>
-                  <a:schemeClr val="tx1"/>
-                </a:solidFill>
-                <a:latin typeface="+mn-lt"/>
-                <a:ea typeface="+mn-ea"/>
-                <a:cs typeface="+mn-cs"/>
-              </a:defRPr>
-            </a:lvl5pPr>
-            <a:lvl6pPr marL="2514600" indent="-228600" algn="l" defTabSz="914400" rtl="0" eaLnBrk="1" latinLnBrk="0" hangingPunct="1">
-              <a:spcBef>
-                <a:spcPct val="20000"/>
-              </a:spcBef>
-              <a:buFont typeface="Arial" panose="020B0604020202020204" pitchFamily="34" charset="0"/>
-              <a:buChar char="•"/>
-              <a:defRPr sz="2000" kern="1200">
-                <a:solidFill>
-                  <a:schemeClr val="tx1"/>
-                </a:solidFill>
-                <a:latin typeface="+mn-lt"/>
-                <a:ea typeface="+mn-ea"/>
-                <a:cs typeface="+mn-cs"/>
-              </a:defRPr>
-            </a:lvl6pPr>
-            <a:lvl7pPr marL="2971800" indent="-228600" algn="l" defTabSz="914400" rtl="0" eaLnBrk="1" latinLnBrk="0" hangingPunct="1">
-              <a:spcBef>
-                <a:spcPct val="20000"/>
-              </a:spcBef>
-              <a:buFont typeface="Arial" panose="020B0604020202020204" pitchFamily="34" charset="0"/>
-              <a:buChar char="•"/>
-              <a:defRPr sz="2000" kern="1200">
-                <a:solidFill>
-                  <a:schemeClr val="tx1"/>
-                </a:solidFill>
-                <a:latin typeface="+mn-lt"/>
-                <a:ea typeface="+mn-ea"/>
-                <a:cs typeface="+mn-cs"/>
-              </a:defRPr>
-            </a:lvl7pPr>
-            <a:lvl8pPr marL="3429000" indent="-228600" algn="l" defTabSz="914400" rtl="0" eaLnBrk="1" latinLnBrk="0" hangingPunct="1">
-              <a:spcBef>
-                <a:spcPct val="20000"/>
-              </a:spcBef>
-              <a:buFont typeface="Arial" panose="020B0604020202020204" pitchFamily="34" charset="0"/>
-              <a:buChar char="•"/>
-              <a:defRPr sz="2000" kern="1200">
-                <a:solidFill>
-                  <a:schemeClr val="tx1"/>
-                </a:solidFill>
-                <a:latin typeface="+mn-lt"/>
-                <a:ea typeface="+mn-ea"/>
-                <a:cs typeface="+mn-cs"/>
-              </a:defRPr>
-            </a:lvl8pPr>
-            <a:lvl9pPr marL="3886200" indent="-228600" algn="l" defTabSz="914400" rtl="0" eaLnBrk="1" latinLnBrk="0" hangingPunct="1">
-              <a:spcBef>
-                <a:spcPct val="20000"/>
-              </a:spcBef>
-              <a:buFont typeface="Arial" panose="020B0604020202020204" pitchFamily="34" charset="0"/>
-              <a:buChar char="•"/>
-              <a:defRPr sz="2000" kern="1200">
-                <a:solidFill>
-                  <a:schemeClr val="tx1"/>
-                </a:solidFill>
-                <a:latin typeface="+mn-lt"/>
-                <a:ea typeface="+mn-ea"/>
-                <a:cs typeface="+mn-cs"/>
-              </a:defRPr>
-            </a:lvl9pPr>
-          </a:lstStyle>
-          <a:p>
-            <a:r>
-              <a:rPr lang="en-US" sz="2800" b="1" dirty="0"/>
-              <a:t>ABV</a:t>
-            </a:r>
-            <a:r>
-              <a:rPr lang="en-US" sz="2800" dirty="0"/>
-              <a:t> (Alcohol by Volume) and </a:t>
-            </a:r>
-            <a:r>
-              <a:rPr lang="en-US" sz="2800" b="1" dirty="0"/>
-              <a:t>IBU</a:t>
-            </a:r>
-            <a:r>
-              <a:rPr lang="en-US" sz="2800" dirty="0"/>
-              <a:t> (International Bitterness Units) serve as good predictors of beer styles</a:t>
-            </a:r>
-          </a:p>
-          <a:p>
-            <a:r>
-              <a:rPr lang="en-US" sz="2800" b="1" dirty="0"/>
-              <a:t>Regional preferences </a:t>
-            </a:r>
-            <a:r>
-              <a:rPr lang="en-US" sz="2800" dirty="0"/>
-              <a:t>can be seen in the charts for a beer’s bitterness</a:t>
-            </a:r>
-          </a:p>
-          <a:p>
-            <a:r>
-              <a:rPr lang="en-US" sz="2800" dirty="0"/>
-              <a:t>There are fewer craft beers/ breweries in the </a:t>
-            </a:r>
-            <a:r>
-              <a:rPr lang="en-US" sz="2800" b="1" dirty="0"/>
-              <a:t>Northeast</a:t>
-            </a:r>
-            <a:r>
-              <a:rPr lang="en-US" sz="2800" dirty="0"/>
-              <a:t> and </a:t>
-            </a:r>
-            <a:r>
-              <a:rPr lang="en-US" sz="2800" b="1" dirty="0"/>
-              <a:t>South</a:t>
-            </a:r>
-            <a:r>
-              <a:rPr lang="en-US" sz="2800" dirty="0"/>
-              <a:t> regions</a:t>
-            </a:r>
-          </a:p>
-          <a:p>
-            <a:r>
-              <a:rPr lang="en-US" sz="2800" b="1" dirty="0"/>
-              <a:t>Opportunities</a:t>
-            </a:r>
-            <a:r>
-              <a:rPr lang="en-US" sz="2800" dirty="0"/>
-              <a:t> for product differentiation with </a:t>
-            </a:r>
-            <a:r>
-              <a:rPr lang="en-US" sz="2800" b="1" dirty="0"/>
-              <a:t>lower IBU </a:t>
-            </a:r>
-            <a:r>
-              <a:rPr lang="en-US" sz="2800" dirty="0"/>
-              <a:t>ratings</a:t>
-            </a:r>
-          </a:p>
-          <a:p>
-            <a:pPr marL="0" indent="0">
-              <a:buFont typeface="Arial" charset="0"/>
-              <a:buNone/>
-            </a:pPr>
-            <a:endParaRPr lang="en-US" sz="1600" i="1" dirty="0"/>
-          </a:p>
-          <a:p>
-            <a:endParaRPr lang="en-US" dirty="0"/>
-          </a:p>
-          <a:p>
-            <a:pPr marL="0" indent="0">
-              <a:buFont typeface="Arial" charset="0"/>
-              <a:buNone/>
-            </a:pPr>
-            <a:endParaRPr lang="en-US" dirty="0"/>
-          </a:p>
-        </p:txBody>
-      </p:sp>
-    </p:spTree>
-    <p:extLst>
-      <p:ext uri="{BB962C8B-B14F-4D97-AF65-F5344CB8AC3E}">
-        <p14:creationId xmlns:p14="http://schemas.microsoft.com/office/powerpoint/2010/main" val="1981835246"/>
-      </p:ext>
-    </p:extLst>
-  </p:cSld>
-  <p:clrMapOvr>
-    <a:masterClrMapping/>
-  </p:clrMapOvr>
-</p:sld>
-</file>
-
-<file path=ppt/slides/slide26.xml><?xml version="1.0" encoding="utf-8"?>
-<p:sld xmlns:a="http://schemas.openxmlformats.org/drawingml/2006/main" xmlns:r="http://schemas.openxmlformats.org/officeDocument/2006/relationships" xmlns:p="http://schemas.openxmlformats.org/presentationml/2006/main">
-  <p:cSld>
-    <p:spTree>
-      <p:nvGrpSpPr>
-        <p:cNvPr id="1" name=""/>
-        <p:cNvGrpSpPr/>
-        <p:nvPr/>
-      </p:nvGrpSpPr>
-      <p:grpSpPr>
-        <a:xfrm>
-          <a:off x="0" y="0"/>
-          <a:ext cx="0" cy="0"/>
-          <a:chOff x="0" y="0"/>
-          <a:chExt cx="0" cy="0"/>
-        </a:xfrm>
-      </p:grpSpPr>
-    </p:spTree>
-    <p:extLst>
-      <p:ext uri="{BB962C8B-B14F-4D97-AF65-F5344CB8AC3E}">
-        <p14:creationId xmlns:p14="http://schemas.microsoft.com/office/powerpoint/2010/main" val="876298325"/>
       </p:ext>
     </p:extLst>
   </p:cSld>

</xml_diff>

<commit_message>
update class number on opening slide
</commit_message>
<xml_diff>
--- a/presentation/DS7346_Cloud_Computing_Presentation.pptx
+++ b/presentation/DS7346_Cloud_Computing_Presentation.pptx
@@ -689,7 +689,7 @@
           <a:p>
             <a:fld id="{1B0D91D7-F22D-4CDC-8F75-E7F369B9B3B7}" type="slidenum">
               <a:rPr lang="en-US" smtClean="0"/>
-              <a:t>10</a:t>
+              <a:t>11</a:t>
             </a:fld>
             <a:endParaRPr lang="en-US"/>
           </a:p>
@@ -846,7 +846,7 @@
           <a:p>
             <a:fld id="{1B0D91D7-F22D-4CDC-8F75-E7F369B9B3B7}" type="slidenum">
               <a:rPr lang="en-US" smtClean="0"/>
-              <a:t>11</a:t>
+              <a:t>12</a:t>
             </a:fld>
             <a:endParaRPr lang="en-US"/>
           </a:p>
@@ -930,7 +930,7 @@
           <a:p>
             <a:fld id="{1B0D91D7-F22D-4CDC-8F75-E7F369B9B3B7}" type="slidenum">
               <a:rPr lang="en-US" smtClean="0"/>
-              <a:t>12</a:t>
+              <a:t>13</a:t>
             </a:fld>
             <a:endParaRPr lang="en-US"/>
           </a:p>
@@ -1171,7 +1171,7 @@
           <a:p>
             <a:fld id="{1B0D91D7-F22D-4CDC-8F75-E7F369B9B3B7}" type="slidenum">
               <a:rPr lang="en-US" smtClean="0"/>
-              <a:t>13</a:t>
+              <a:t>14</a:t>
             </a:fld>
             <a:endParaRPr lang="en-US"/>
           </a:p>
@@ -1255,7 +1255,7 @@
           <a:p>
             <a:fld id="{1B0D91D7-F22D-4CDC-8F75-E7F369B9B3B7}" type="slidenum">
               <a:rPr lang="en-US" smtClean="0"/>
-              <a:t>16</a:t>
+              <a:t>17</a:t>
             </a:fld>
             <a:endParaRPr lang="en-US"/>
           </a:p>
@@ -1339,7 +1339,7 @@
           <a:p>
             <a:fld id="{1B0D91D7-F22D-4CDC-8F75-E7F369B9B3B7}" type="slidenum">
               <a:rPr lang="en-US" smtClean="0"/>
-              <a:t>17</a:t>
+              <a:t>18</a:t>
             </a:fld>
             <a:endParaRPr lang="en-US"/>
           </a:p>
@@ -1444,7 +1444,7 @@
           <a:p>
             <a:fld id="{1B0D91D7-F22D-4CDC-8F75-E7F369B9B3B7}" type="slidenum">
               <a:rPr lang="en-US" smtClean="0"/>
-              <a:t>18</a:t>
+              <a:t>19</a:t>
             </a:fld>
             <a:endParaRPr lang="en-US"/>
           </a:p>
@@ -1528,7 +1528,7 @@
           <a:p>
             <a:fld id="{1B0D91D7-F22D-4CDC-8F75-E7F369B9B3B7}" type="slidenum">
               <a:rPr lang="en-US" smtClean="0"/>
-              <a:t>19</a:t>
+              <a:t>20</a:t>
             </a:fld>
             <a:endParaRPr lang="en-US"/>
           </a:p>
@@ -3744,8 +3744,12 @@
           <a:lstStyle/>
           <a:p>
             <a:r>
+              <a:rPr lang="en-US"/>
+              <a:t>DS 7346: </a:t>
+            </a:r>
+            <a:r>
               <a:rPr lang="en-US" dirty="0"/>
-              <a:t>DS 6346: Cloud Computing</a:t>
+              <a:t>Cloud Computing</a:t>
             </a:r>
             <a:endParaRPr lang="en-IN" dirty="0"/>
           </a:p>

</xml_diff>